<commit_message>
tweaks to first CPS lecture
</commit_message>
<xml_diff>
--- a/ClassMaterials/CPS/CPS intro.pptx
+++ b/ClassMaterials/CPS/CPS intro.pptx
@@ -6,12 +6,14 @@
   </p:sldMasterIdLst>
   <p:sldIdLst>
     <p:sldId id="256" r:id="rId2"/>
-    <p:sldId id="257" r:id="rId3"/>
-    <p:sldId id="258" r:id="rId4"/>
-    <p:sldId id="259" r:id="rId5"/>
-    <p:sldId id="260" r:id="rId6"/>
-    <p:sldId id="261" r:id="rId7"/>
-    <p:sldId id="262" r:id="rId8"/>
+    <p:sldId id="263" r:id="rId3"/>
+    <p:sldId id="264" r:id="rId4"/>
+    <p:sldId id="257" r:id="rId5"/>
+    <p:sldId id="258" r:id="rId6"/>
+    <p:sldId id="259" r:id="rId7"/>
+    <p:sldId id="260" r:id="rId8"/>
+    <p:sldId id="261" r:id="rId9"/>
+    <p:sldId id="262" r:id="rId10"/>
   </p:sldIdLst>
   <p:sldSz cx="12192000" cy="6858000"/>
   <p:notesSz cx="6858000" cy="9144000"/>
@@ -110,6 +112,11 @@
       </a:defRPr>
     </a:lvl9pPr>
   </p:defaultTextStyle>
+  <p:extLst>
+    <p:ext uri="{EFAFB233-063F-42B5-8137-9DF3F51BA10A}">
+      <p15:sldGuideLst xmlns:p15="http://schemas.microsoft.com/office/powerpoint/2012/main"/>
+    </p:ext>
+  </p:extLst>
 </p:presentation>
 </file>
 
@@ -260,7 +267,7 @@
           <a:p>
             <a:fld id="{9440ADD7-BD8E-48E1-A930-9BA64A1DD9A7}" type="datetimeFigureOut">
               <a:rPr lang="en-US" smtClean="0"/>
-              <a:t>7/12/2023</a:t>
+              <a:t>10/13/2023</a:t>
             </a:fld>
             <a:endParaRPr lang="en-US"/>
           </a:p>
@@ -458,7 +465,7 @@
           <a:p>
             <a:fld id="{9440ADD7-BD8E-48E1-A930-9BA64A1DD9A7}" type="datetimeFigureOut">
               <a:rPr lang="en-US" smtClean="0"/>
-              <a:t>7/12/2023</a:t>
+              <a:t>10/13/2023</a:t>
             </a:fld>
             <a:endParaRPr lang="en-US"/>
           </a:p>
@@ -666,7 +673,7 @@
           <a:p>
             <a:fld id="{9440ADD7-BD8E-48E1-A930-9BA64A1DD9A7}" type="datetimeFigureOut">
               <a:rPr lang="en-US" smtClean="0"/>
-              <a:t>7/12/2023</a:t>
+              <a:t>10/13/2023</a:t>
             </a:fld>
             <a:endParaRPr lang="en-US"/>
           </a:p>
@@ -864,7 +871,7 @@
           <a:p>
             <a:fld id="{9440ADD7-BD8E-48E1-A930-9BA64A1DD9A7}" type="datetimeFigureOut">
               <a:rPr lang="en-US" smtClean="0"/>
-              <a:t>7/12/2023</a:t>
+              <a:t>10/13/2023</a:t>
             </a:fld>
             <a:endParaRPr lang="en-US"/>
           </a:p>
@@ -1139,7 +1146,7 @@
           <a:p>
             <a:fld id="{9440ADD7-BD8E-48E1-A930-9BA64A1DD9A7}" type="datetimeFigureOut">
               <a:rPr lang="en-US" smtClean="0"/>
-              <a:t>7/12/2023</a:t>
+              <a:t>10/13/2023</a:t>
             </a:fld>
             <a:endParaRPr lang="en-US"/>
           </a:p>
@@ -1404,7 +1411,7 @@
           <a:p>
             <a:fld id="{9440ADD7-BD8E-48E1-A930-9BA64A1DD9A7}" type="datetimeFigureOut">
               <a:rPr lang="en-US" smtClean="0"/>
-              <a:t>7/12/2023</a:t>
+              <a:t>10/13/2023</a:t>
             </a:fld>
             <a:endParaRPr lang="en-US"/>
           </a:p>
@@ -1816,7 +1823,7 @@
           <a:p>
             <a:fld id="{9440ADD7-BD8E-48E1-A930-9BA64A1DD9A7}" type="datetimeFigureOut">
               <a:rPr lang="en-US" smtClean="0"/>
-              <a:t>7/12/2023</a:t>
+              <a:t>10/13/2023</a:t>
             </a:fld>
             <a:endParaRPr lang="en-US"/>
           </a:p>
@@ -1957,7 +1964,7 @@
           <a:p>
             <a:fld id="{9440ADD7-BD8E-48E1-A930-9BA64A1DD9A7}" type="datetimeFigureOut">
               <a:rPr lang="en-US" smtClean="0"/>
-              <a:t>7/12/2023</a:t>
+              <a:t>10/13/2023</a:t>
             </a:fld>
             <a:endParaRPr lang="en-US"/>
           </a:p>
@@ -2070,7 +2077,7 @@
           <a:p>
             <a:fld id="{9440ADD7-BD8E-48E1-A930-9BA64A1DD9A7}" type="datetimeFigureOut">
               <a:rPr lang="en-US" smtClean="0"/>
-              <a:t>7/12/2023</a:t>
+              <a:t>10/13/2023</a:t>
             </a:fld>
             <a:endParaRPr lang="en-US"/>
           </a:p>
@@ -2381,7 +2388,7 @@
           <a:p>
             <a:fld id="{9440ADD7-BD8E-48E1-A930-9BA64A1DD9A7}" type="datetimeFigureOut">
               <a:rPr lang="en-US" smtClean="0"/>
-              <a:t>7/12/2023</a:t>
+              <a:t>10/13/2023</a:t>
             </a:fld>
             <a:endParaRPr lang="en-US"/>
           </a:p>
@@ -2669,7 +2676,7 @@
           <a:p>
             <a:fld id="{9440ADD7-BD8E-48E1-A930-9BA64A1DD9A7}" type="datetimeFigureOut">
               <a:rPr lang="en-US" smtClean="0"/>
-              <a:t>7/12/2023</a:t>
+              <a:t>10/13/2023</a:t>
             </a:fld>
             <a:endParaRPr lang="en-US"/>
           </a:p>
@@ -2910,7 +2917,7 @@
           <a:p>
             <a:fld id="{9440ADD7-BD8E-48E1-A930-9BA64A1DD9A7}" type="datetimeFigureOut">
               <a:rPr lang="en-US" smtClean="0"/>
-              <a:t>7/12/2023</a:t>
+              <a:t>10/13/2023</a:t>
             </a:fld>
             <a:endParaRPr lang="en-US"/>
           </a:p>
@@ -3418,6 +3425,225 @@
           <p:cNvPr id="2" name="Title 1">
             <a:extLst>
               <a:ext uri="{FF2B5EF4-FFF2-40B4-BE49-F238E27FC236}">
+                <a16:creationId xmlns:a16="http://schemas.microsoft.com/office/drawing/2014/main" id="{00250717-3691-AD88-7753-F8E6C0BEBFE6}"/>
+              </a:ext>
+            </a:extLst>
+          </p:cNvPr>
+          <p:cNvSpPr>
+            <a:spLocks noGrp="1"/>
+          </p:cNvSpPr>
+          <p:nvPr>
+            <p:ph type="title"/>
+          </p:nvPr>
+        </p:nvSpPr>
+        <p:spPr/>
+        <p:txBody>
+          <a:bodyPr/>
+          <a:lstStyle/>
+          <a:p>
+            <a:r>
+              <a:rPr lang="en-US" dirty="0"/>
+              <a:t>What is continuation passing style?</a:t>
+            </a:r>
+          </a:p>
+        </p:txBody>
+      </p:sp>
+      <p:sp>
+        <p:nvSpPr>
+          <p:cNvPr id="3" name="Content Placeholder 2">
+            <a:extLst>
+              <a:ext uri="{FF2B5EF4-FFF2-40B4-BE49-F238E27FC236}">
+                <a16:creationId xmlns:a16="http://schemas.microsoft.com/office/drawing/2014/main" id="{34527F75-7862-3B38-6588-CF3DDCF3D439}"/>
+              </a:ext>
+            </a:extLst>
+          </p:cNvPr>
+          <p:cNvSpPr>
+            <a:spLocks noGrp="1"/>
+          </p:cNvSpPr>
+          <p:nvPr>
+            <p:ph idx="1"/>
+          </p:nvPr>
+        </p:nvSpPr>
+        <p:spPr/>
+        <p:txBody>
+          <a:bodyPr/>
+          <a:lstStyle/>
+          <a:p>
+            <a:r>
+              <a:rPr lang="en-US" dirty="0"/>
+              <a:t>A process to convert recursive procedures into fully tail recursive procedures</a:t>
+            </a:r>
+          </a:p>
+          <a:p>
+            <a:r>
+              <a:rPr lang="en-US" dirty="0"/>
+              <a:t>Why?</a:t>
+            </a:r>
+          </a:p>
+          <a:p>
+            <a:pPr lvl="1"/>
+            <a:r>
+              <a:rPr lang="en-US" dirty="0"/>
+              <a:t>Once we explicitly represent the continuation as a data structure certain previously impossible tricks become possible</a:t>
+            </a:r>
+          </a:p>
+          <a:p>
+            <a:pPr lvl="1"/>
+            <a:r>
+              <a:rPr lang="en-US" dirty="0"/>
+              <a:t>This forms the basis of scheme’s continuations which is a very powerful and weird language feature</a:t>
+            </a:r>
+          </a:p>
+          <a:p>
+            <a:pPr lvl="1"/>
+            <a:r>
+              <a:rPr lang="en-US" dirty="0"/>
+              <a:t>The fact that this conversion is possible illustrates something deep about the interrelationship between iteration and recursion AND eventually the relationship between data and code</a:t>
+            </a:r>
+          </a:p>
+        </p:txBody>
+      </p:sp>
+    </p:spTree>
+    <p:extLst>
+      <p:ext uri="{BB962C8B-B14F-4D97-AF65-F5344CB8AC3E}">
+        <p14:creationId xmlns:p14="http://schemas.microsoft.com/office/powerpoint/2010/main" val="3253436679"/>
+      </p:ext>
+    </p:extLst>
+  </p:cSld>
+  <p:clrMapOvr>
+    <a:masterClrMapping/>
+  </p:clrMapOvr>
+</p:sld>
+</file>
+
+<file path=ppt/slides/slide3.xml><?xml version="1.0" encoding="utf-8"?>
+<p:sld xmlns:a="http://schemas.openxmlformats.org/drawingml/2006/main" xmlns:r="http://schemas.openxmlformats.org/officeDocument/2006/relationships" xmlns:p="http://schemas.openxmlformats.org/presentationml/2006/main">
+  <p:cSld>
+    <p:spTree>
+      <p:nvGrpSpPr>
+        <p:cNvPr id="1" name=""/>
+        <p:cNvGrpSpPr/>
+        <p:nvPr/>
+      </p:nvGrpSpPr>
+      <p:grpSpPr>
+        <a:xfrm>
+          <a:off x="0" y="0"/>
+          <a:ext cx="0" cy="0"/>
+          <a:chOff x="0" y="0"/>
+          <a:chExt cx="0" cy="0"/>
+        </a:xfrm>
+      </p:grpSpPr>
+      <p:sp>
+        <p:nvSpPr>
+          <p:cNvPr id="2" name="Title 1">
+            <a:extLst>
+              <a:ext uri="{FF2B5EF4-FFF2-40B4-BE49-F238E27FC236}">
+                <a16:creationId xmlns:a16="http://schemas.microsoft.com/office/drawing/2014/main" id="{7181C3BC-8F96-0CCD-681D-B2FF34B4A640}"/>
+              </a:ext>
+            </a:extLst>
+          </p:cNvPr>
+          <p:cNvSpPr>
+            <a:spLocks noGrp="1"/>
+          </p:cNvSpPr>
+          <p:nvPr>
+            <p:ph type="title"/>
+          </p:nvPr>
+        </p:nvSpPr>
+        <p:spPr/>
+        <p:txBody>
+          <a:bodyPr/>
+          <a:lstStyle/>
+          <a:p>
+            <a:r>
+              <a:rPr lang="en-US" dirty="0"/>
+              <a:t>I expect you to learn this procedure</a:t>
+            </a:r>
+          </a:p>
+        </p:txBody>
+      </p:sp>
+      <p:sp>
+        <p:nvSpPr>
+          <p:cNvPr id="3" name="Content Placeholder 2">
+            <a:extLst>
+              <a:ext uri="{FF2B5EF4-FFF2-40B4-BE49-F238E27FC236}">
+                <a16:creationId xmlns:a16="http://schemas.microsoft.com/office/drawing/2014/main" id="{E44E1C98-DE19-E4E8-771E-CE3D266EBAC8}"/>
+              </a:ext>
+            </a:extLst>
+          </p:cNvPr>
+          <p:cNvSpPr>
+            <a:spLocks noGrp="1"/>
+          </p:cNvSpPr>
+          <p:nvPr>
+            <p:ph idx="1"/>
+          </p:nvPr>
+        </p:nvSpPr>
+        <p:spPr/>
+        <p:txBody>
+          <a:bodyPr/>
+          <a:lstStyle/>
+          <a:p>
+            <a:r>
+              <a:rPr lang="en-US" dirty="0"/>
+              <a:t>You will have to both understand</a:t>
+            </a:r>
+          </a:p>
+          <a:p>
+            <a:pPr lvl="1"/>
+            <a:r>
+              <a:rPr lang="en-US" dirty="0"/>
+              <a:t>How to do it</a:t>
+            </a:r>
+          </a:p>
+          <a:p>
+            <a:pPr lvl="1"/>
+            <a:r>
+              <a:rPr lang="en-US" dirty="0"/>
+              <a:t>Why it works</a:t>
+            </a:r>
+          </a:p>
+          <a:p>
+            <a:r>
+              <a:rPr lang="en-US" dirty="0"/>
+              <a:t>I will try to explain, but this is likely something you need to reflect on yourself, and prove to yourself it is correct</a:t>
+            </a:r>
+          </a:p>
+        </p:txBody>
+      </p:sp>
+    </p:spTree>
+    <p:extLst>
+      <p:ext uri="{BB962C8B-B14F-4D97-AF65-F5344CB8AC3E}">
+        <p14:creationId xmlns:p14="http://schemas.microsoft.com/office/powerpoint/2010/main" val="2900738826"/>
+      </p:ext>
+    </p:extLst>
+  </p:cSld>
+  <p:clrMapOvr>
+    <a:masterClrMapping/>
+  </p:clrMapOvr>
+</p:sld>
+</file>
+
+<file path=ppt/slides/slide4.xml><?xml version="1.0" encoding="utf-8"?>
+<p:sld xmlns:a="http://schemas.openxmlformats.org/drawingml/2006/main" xmlns:r="http://schemas.openxmlformats.org/officeDocument/2006/relationships" xmlns:p="http://schemas.openxmlformats.org/presentationml/2006/main">
+  <p:cSld>
+    <p:spTree>
+      <p:nvGrpSpPr>
+        <p:cNvPr id="1" name=""/>
+        <p:cNvGrpSpPr/>
+        <p:nvPr/>
+      </p:nvGrpSpPr>
+      <p:grpSpPr>
+        <a:xfrm>
+          <a:off x="0" y="0"/>
+          <a:ext cx="0" cy="0"/>
+          <a:chOff x="0" y="0"/>
+          <a:chExt cx="0" cy="0"/>
+        </a:xfrm>
+      </p:grpSpPr>
+      <p:sp>
+        <p:nvSpPr>
+          <p:cNvPr id="2" name="Title 1">
+            <a:extLst>
+              <a:ext uri="{FF2B5EF4-FFF2-40B4-BE49-F238E27FC236}">
                 <a16:creationId xmlns:a16="http://schemas.microsoft.com/office/drawing/2014/main" id="{D947CD4C-A172-4C36-92D7-ECE317EBA0D4}"/>
               </a:ext>
             </a:extLst>
@@ -3670,7 +3896,7 @@
 </p:sld>
 </file>
 
-<file path=ppt/slides/slide3.xml><?xml version="1.0" encoding="utf-8"?>
+<file path=ppt/slides/slide5.xml><?xml version="1.0" encoding="utf-8"?>
 <p:sld xmlns:a="http://schemas.openxmlformats.org/drawingml/2006/main" xmlns:r="http://schemas.openxmlformats.org/officeDocument/2006/relationships" xmlns:p="http://schemas.openxmlformats.org/presentationml/2006/main">
   <p:cSld>
     <p:spTree>
@@ -4050,383 +4276,6 @@
 </p:sld>
 </file>
 
-<file path=ppt/slides/slide4.xml><?xml version="1.0" encoding="utf-8"?>
-<p:sld xmlns:a="http://schemas.openxmlformats.org/drawingml/2006/main" xmlns:r="http://schemas.openxmlformats.org/officeDocument/2006/relationships" xmlns:p="http://schemas.openxmlformats.org/presentationml/2006/main">
-  <p:cSld>
-    <p:spTree>
-      <p:nvGrpSpPr>
-        <p:cNvPr id="1" name=""/>
-        <p:cNvGrpSpPr/>
-        <p:nvPr/>
-      </p:nvGrpSpPr>
-      <p:grpSpPr>
-        <a:xfrm>
-          <a:off x="0" y="0"/>
-          <a:ext cx="0" cy="0"/>
-          <a:chOff x="0" y="0"/>
-          <a:chExt cx="0" cy="0"/>
-        </a:xfrm>
-      </p:grpSpPr>
-      <p:sp>
-        <p:nvSpPr>
-          <p:cNvPr id="2" name="Title 1">
-            <a:extLst>
-              <a:ext uri="{FF2B5EF4-FFF2-40B4-BE49-F238E27FC236}">
-                <a16:creationId xmlns:a16="http://schemas.microsoft.com/office/drawing/2014/main" id="{115BADC7-8BC2-43DE-B20E-1A30AE1CF795}"/>
-              </a:ext>
-            </a:extLst>
-          </p:cNvPr>
-          <p:cNvSpPr>
-            <a:spLocks noGrp="1"/>
-          </p:cNvSpPr>
-          <p:nvPr>
-            <p:ph type="title"/>
-          </p:nvPr>
-        </p:nvSpPr>
-        <p:spPr/>
-        <p:txBody>
-          <a:bodyPr/>
-          <a:lstStyle/>
-          <a:p>
-            <a:r>
-              <a:rPr lang="en-US" dirty="0"/>
-              <a:t>The Basic Idea</a:t>
-            </a:r>
-          </a:p>
-        </p:txBody>
-      </p:sp>
-      <p:sp>
-        <p:nvSpPr>
-          <p:cNvPr id="3" name="Content Placeholder 2">
-            <a:extLst>
-              <a:ext uri="{FF2B5EF4-FFF2-40B4-BE49-F238E27FC236}">
-                <a16:creationId xmlns:a16="http://schemas.microsoft.com/office/drawing/2014/main" id="{7B2BD4E5-A1B4-4485-B584-7D5971C5CE3A}"/>
-              </a:ext>
-            </a:extLst>
-          </p:cNvPr>
-          <p:cNvSpPr>
-            <a:spLocks noGrp="1"/>
-          </p:cNvSpPr>
-          <p:nvPr>
-            <p:ph idx="1"/>
-          </p:nvPr>
-        </p:nvSpPr>
-        <p:spPr/>
-        <p:txBody>
-          <a:bodyPr/>
-          <a:lstStyle/>
-          <a:p>
-            <a:r>
-              <a:rPr lang="en-US" dirty="0"/>
-              <a:t>An algorithm is hard to convert to tail recursive form when the “deferred” work is complex </a:t>
-            </a:r>
-          </a:p>
-          <a:p>
-            <a:r>
-              <a:rPr lang="en-US" dirty="0"/>
-              <a:t>But if we construct a complex data structure, we can remind ourselves what we need to do next.  A “to do” list that reminds us what is next after we finish some particular bit of the calculation.  This structure is called </a:t>
-            </a:r>
-            <a:r>
-              <a:rPr lang="en-US" i="1" dirty="0"/>
-              <a:t>the continuation</a:t>
-            </a:r>
-            <a:r>
-              <a:rPr lang="en-US" dirty="0"/>
-              <a:t> (often abbreviated k)</a:t>
-            </a:r>
-          </a:p>
-          <a:p>
-            <a:endParaRPr lang="en-US" dirty="0"/>
-          </a:p>
-        </p:txBody>
-      </p:sp>
-    </p:spTree>
-    <p:extLst>
-      <p:ext uri="{BB962C8B-B14F-4D97-AF65-F5344CB8AC3E}">
-        <p14:creationId xmlns:p14="http://schemas.microsoft.com/office/powerpoint/2010/main" val="2804711085"/>
-      </p:ext>
-    </p:extLst>
-  </p:cSld>
-  <p:clrMapOvr>
-    <a:masterClrMapping/>
-  </p:clrMapOvr>
-</p:sld>
-</file>
-
-<file path=ppt/slides/slide5.xml><?xml version="1.0" encoding="utf-8"?>
-<p:sld xmlns:a="http://schemas.openxmlformats.org/drawingml/2006/main" xmlns:r="http://schemas.openxmlformats.org/officeDocument/2006/relationships" xmlns:p="http://schemas.openxmlformats.org/presentationml/2006/main">
-  <p:cSld>
-    <p:spTree>
-      <p:nvGrpSpPr>
-        <p:cNvPr id="1" name=""/>
-        <p:cNvGrpSpPr/>
-        <p:nvPr/>
-      </p:nvGrpSpPr>
-      <p:grpSpPr>
-        <a:xfrm>
-          <a:off x="0" y="0"/>
-          <a:ext cx="0" cy="0"/>
-          <a:chOff x="0" y="0"/>
-          <a:chExt cx="0" cy="0"/>
-        </a:xfrm>
-      </p:grpSpPr>
-      <p:sp>
-        <p:nvSpPr>
-          <p:cNvPr id="3" name="Content Placeholder 2">
-            <a:extLst>
-              <a:ext uri="{FF2B5EF4-FFF2-40B4-BE49-F238E27FC236}">
-                <a16:creationId xmlns:a16="http://schemas.microsoft.com/office/drawing/2014/main" id="{E902EB0D-35F6-4B2C-B746-80E72390CBBF}"/>
-              </a:ext>
-            </a:extLst>
-          </p:cNvPr>
-          <p:cNvSpPr>
-            <a:spLocks noGrp="1"/>
-          </p:cNvSpPr>
-          <p:nvPr>
-            <p:ph idx="1"/>
-          </p:nvPr>
-        </p:nvSpPr>
-        <p:spPr>
-          <a:xfrm>
-            <a:off x="137160" y="169545"/>
-            <a:ext cx="11917680" cy="4351338"/>
-          </a:xfrm>
-        </p:spPr>
-        <p:txBody>
-          <a:bodyPr>
-            <a:normAutofit/>
-          </a:bodyPr>
-          <a:lstStyle/>
-          <a:p>
-            <a:pPr marL="0" indent="0">
-              <a:buNone/>
-            </a:pPr>
-            <a:r>
-              <a:rPr lang="en-US" sz="2400" dirty="0">
-                <a:latin typeface="Consolas" panose="020B0609020204030204" pitchFamily="49" charset="0"/>
-              </a:rPr>
-              <a:t>(define powerset</a:t>
-            </a:r>
-          </a:p>
-          <a:p>
-            <a:pPr marL="0" indent="0">
-              <a:buNone/>
-            </a:pPr>
-            <a:r>
-              <a:rPr lang="en-US" sz="2400" dirty="0">
-                <a:latin typeface="Consolas" panose="020B0609020204030204" pitchFamily="49" charset="0"/>
-              </a:rPr>
-              <a:t>  (lambda (</a:t>
-            </a:r>
-            <a:r>
-              <a:rPr lang="en-US" sz="2400" dirty="0" err="1">
-                <a:latin typeface="Consolas" panose="020B0609020204030204" pitchFamily="49" charset="0"/>
-              </a:rPr>
-              <a:t>lst</a:t>
-            </a:r>
-            <a:r>
-              <a:rPr lang="en-US" sz="2400" dirty="0">
-                <a:latin typeface="Consolas" panose="020B0609020204030204" pitchFamily="49" charset="0"/>
-              </a:rPr>
-              <a:t>)</a:t>
-            </a:r>
-          </a:p>
-          <a:p>
-            <a:pPr marL="0" indent="0">
-              <a:buNone/>
-            </a:pPr>
-            <a:r>
-              <a:rPr lang="en-US" sz="2400" dirty="0">
-                <a:latin typeface="Consolas" panose="020B0609020204030204" pitchFamily="49" charset="0"/>
-              </a:rPr>
-              <a:t>    (if (null? </a:t>
-            </a:r>
-            <a:r>
-              <a:rPr lang="en-US" sz="2400" dirty="0" err="1">
-                <a:latin typeface="Consolas" panose="020B0609020204030204" pitchFamily="49" charset="0"/>
-              </a:rPr>
-              <a:t>lst</a:t>
-            </a:r>
-            <a:r>
-              <a:rPr lang="en-US" sz="2400" dirty="0">
-                <a:latin typeface="Consolas" panose="020B0609020204030204" pitchFamily="49" charset="0"/>
-              </a:rPr>
-              <a:t>)</a:t>
-            </a:r>
-          </a:p>
-          <a:p>
-            <a:pPr marL="0" indent="0">
-              <a:buNone/>
-            </a:pPr>
-            <a:r>
-              <a:rPr lang="en-US" sz="2400" dirty="0">
-                <a:latin typeface="Consolas" panose="020B0609020204030204" pitchFamily="49" charset="0"/>
-              </a:rPr>
-              <a:t>        '(())</a:t>
-            </a:r>
-          </a:p>
-          <a:p>
-            <a:pPr marL="0" indent="0">
-              <a:buNone/>
-            </a:pPr>
-            <a:r>
-              <a:rPr lang="en-US" sz="2400" dirty="0">
-                <a:latin typeface="Consolas" panose="020B0609020204030204" pitchFamily="49" charset="0"/>
-              </a:rPr>
-              <a:t>        (let* ((sub-powerset (powerset (</a:t>
-            </a:r>
-            <a:r>
-              <a:rPr lang="en-US" sz="2400" dirty="0" err="1">
-                <a:latin typeface="Consolas" panose="020B0609020204030204" pitchFamily="49" charset="0"/>
-              </a:rPr>
-              <a:t>cdr</a:t>
-            </a:r>
-            <a:r>
-              <a:rPr lang="en-US" sz="2400" dirty="0">
-                <a:latin typeface="Consolas" panose="020B0609020204030204" pitchFamily="49" charset="0"/>
-              </a:rPr>
-              <a:t> </a:t>
-            </a:r>
-            <a:r>
-              <a:rPr lang="en-US" sz="2400" dirty="0" err="1">
-                <a:latin typeface="Consolas" panose="020B0609020204030204" pitchFamily="49" charset="0"/>
-              </a:rPr>
-              <a:t>lst</a:t>
-            </a:r>
-            <a:r>
-              <a:rPr lang="en-US" sz="2400" dirty="0">
-                <a:latin typeface="Consolas" panose="020B0609020204030204" pitchFamily="49" charset="0"/>
-              </a:rPr>
-              <a:t>)))</a:t>
-            </a:r>
-          </a:p>
-          <a:p>
-            <a:pPr marL="0" indent="0">
-              <a:buNone/>
-            </a:pPr>
-            <a:r>
-              <a:rPr lang="en-US" sz="2400" dirty="0">
-                <a:latin typeface="Consolas" panose="020B0609020204030204" pitchFamily="49" charset="0"/>
-              </a:rPr>
-              <a:t>               (sub-powerset-with-car (prepend-to-all (car </a:t>
-            </a:r>
-            <a:r>
-              <a:rPr lang="en-US" sz="2400" dirty="0" err="1">
-                <a:latin typeface="Consolas" panose="020B0609020204030204" pitchFamily="49" charset="0"/>
-              </a:rPr>
-              <a:t>lst</a:t>
-            </a:r>
-            <a:r>
-              <a:rPr lang="en-US" sz="2400" dirty="0">
-                <a:latin typeface="Consolas" panose="020B0609020204030204" pitchFamily="49" charset="0"/>
-              </a:rPr>
-              <a:t>)</a:t>
-            </a:r>
-          </a:p>
-          <a:p>
-            <a:pPr marL="0" indent="0">
-              <a:buNone/>
-            </a:pPr>
-            <a:r>
-              <a:rPr lang="en-US" sz="2400" dirty="0">
-                <a:latin typeface="Consolas" panose="020B0609020204030204" pitchFamily="49" charset="0"/>
-              </a:rPr>
-              <a:t>                                                      sub-powerset)))</a:t>
-            </a:r>
-          </a:p>
-          <a:p>
-            <a:pPr marL="0" indent="0">
-              <a:buNone/>
-            </a:pPr>
-            <a:r>
-              <a:rPr lang="en-US" sz="2400" dirty="0">
-                <a:latin typeface="Consolas" panose="020B0609020204030204" pitchFamily="49" charset="0"/>
-              </a:rPr>
-              <a:t>          (append sub-powerset sub-powerset-with-car)))))</a:t>
-            </a:r>
-          </a:p>
-        </p:txBody>
-      </p:sp>
-      <p:sp>
-        <p:nvSpPr>
-          <p:cNvPr id="4" name="TextBox 3">
-            <a:extLst>
-              <a:ext uri="{FF2B5EF4-FFF2-40B4-BE49-F238E27FC236}">
-                <a16:creationId xmlns:a16="http://schemas.microsoft.com/office/drawing/2014/main" id="{2D39F944-DC3D-4B85-A2E8-32C870C94452}"/>
-              </a:ext>
-            </a:extLst>
-          </p:cNvPr>
-          <p:cNvSpPr txBox="1"/>
-          <p:nvPr/>
-        </p:nvSpPr>
-        <p:spPr>
-          <a:xfrm>
-            <a:off x="1381760" y="4846320"/>
-            <a:ext cx="7345680" cy="1631216"/>
-          </a:xfrm>
-          <a:prstGeom prst="rect">
-            <a:avLst/>
-          </a:prstGeom>
-          <a:noFill/>
-        </p:spPr>
-        <p:txBody>
-          <a:bodyPr wrap="square" rtlCol="0">
-            <a:spAutoFit/>
-          </a:bodyPr>
-          <a:lstStyle/>
-          <a:p>
-            <a:r>
-              <a:rPr lang="en-US" sz="2000" dirty="0"/>
-              <a:t>The algorithm:</a:t>
-            </a:r>
-          </a:p>
-          <a:p>
-            <a:r>
-              <a:rPr lang="en-US" sz="2000" dirty="0"/>
-              <a:t>Step 0.  Check if solution is trivial…if not…</a:t>
-            </a:r>
-          </a:p>
-          <a:p>
-            <a:r>
-              <a:rPr lang="en-US" sz="2000" dirty="0"/>
-              <a:t>Step 1.  Calculate the powerset of the </a:t>
-            </a:r>
-            <a:r>
-              <a:rPr lang="en-US" sz="2000" dirty="0" err="1"/>
-              <a:t>cdr</a:t>
-            </a:r>
-            <a:r>
-              <a:rPr lang="en-US" sz="2000" dirty="0"/>
-              <a:t> (sub-powerset)</a:t>
-            </a:r>
-          </a:p>
-          <a:p>
-            <a:r>
-              <a:rPr lang="en-US" sz="2000" dirty="0"/>
-              <a:t>Step 2.  Part the car to each entry (sub-powerset-with-car)</a:t>
-            </a:r>
-          </a:p>
-          <a:p>
-            <a:r>
-              <a:rPr lang="en-US" sz="2000" dirty="0"/>
-              <a:t>Step 3.  Append sub-powerset and sub-powerset-with-car together</a:t>
-            </a:r>
-          </a:p>
-        </p:txBody>
-      </p:sp>
-    </p:spTree>
-    <p:extLst>
-      <p:ext uri="{BB962C8B-B14F-4D97-AF65-F5344CB8AC3E}">
-        <p14:creationId xmlns:p14="http://schemas.microsoft.com/office/powerpoint/2010/main" val="335906857"/>
-      </p:ext>
-    </p:extLst>
-  </p:cSld>
-  <p:clrMapOvr>
-    <a:masterClrMapping/>
-  </p:clrMapOvr>
-</p:sld>
-</file>
-
 <file path=ppt/slides/slide6.xml><?xml version="1.0" encoding="utf-8"?>
 <p:sld xmlns:a="http://schemas.openxmlformats.org/drawingml/2006/main" xmlns:r="http://schemas.openxmlformats.org/officeDocument/2006/relationships" xmlns:p="http://schemas.openxmlformats.org/presentationml/2006/main">
   <p:cSld>
@@ -4449,6 +4298,383 @@
           <p:cNvPr id="2" name="Title 1">
             <a:extLst>
               <a:ext uri="{FF2B5EF4-FFF2-40B4-BE49-F238E27FC236}">
+                <a16:creationId xmlns:a16="http://schemas.microsoft.com/office/drawing/2014/main" id="{115BADC7-8BC2-43DE-B20E-1A30AE1CF795}"/>
+              </a:ext>
+            </a:extLst>
+          </p:cNvPr>
+          <p:cNvSpPr>
+            <a:spLocks noGrp="1"/>
+          </p:cNvSpPr>
+          <p:nvPr>
+            <p:ph type="title"/>
+          </p:nvPr>
+        </p:nvSpPr>
+        <p:spPr/>
+        <p:txBody>
+          <a:bodyPr/>
+          <a:lstStyle/>
+          <a:p>
+            <a:r>
+              <a:rPr lang="en-US" dirty="0"/>
+              <a:t>The Basic Idea</a:t>
+            </a:r>
+          </a:p>
+        </p:txBody>
+      </p:sp>
+      <p:sp>
+        <p:nvSpPr>
+          <p:cNvPr id="3" name="Content Placeholder 2">
+            <a:extLst>
+              <a:ext uri="{FF2B5EF4-FFF2-40B4-BE49-F238E27FC236}">
+                <a16:creationId xmlns:a16="http://schemas.microsoft.com/office/drawing/2014/main" id="{7B2BD4E5-A1B4-4485-B584-7D5971C5CE3A}"/>
+              </a:ext>
+            </a:extLst>
+          </p:cNvPr>
+          <p:cNvSpPr>
+            <a:spLocks noGrp="1"/>
+          </p:cNvSpPr>
+          <p:nvPr>
+            <p:ph idx="1"/>
+          </p:nvPr>
+        </p:nvSpPr>
+        <p:spPr/>
+        <p:txBody>
+          <a:bodyPr/>
+          <a:lstStyle/>
+          <a:p>
+            <a:r>
+              <a:rPr lang="en-US" dirty="0"/>
+              <a:t>An algorithm is hard to convert to tail recursive form when the “deferred” work is complex </a:t>
+            </a:r>
+          </a:p>
+          <a:p>
+            <a:r>
+              <a:rPr lang="en-US" dirty="0"/>
+              <a:t>But if we construct a complex data structure, we can remind ourselves what we need to do next.  A “to do” list that reminds us what is next after we finish some particular bit of the calculation.  This structure is called </a:t>
+            </a:r>
+            <a:r>
+              <a:rPr lang="en-US" i="1" dirty="0"/>
+              <a:t>the continuation</a:t>
+            </a:r>
+            <a:r>
+              <a:rPr lang="en-US" dirty="0"/>
+              <a:t> (often abbreviated k)</a:t>
+            </a:r>
+          </a:p>
+          <a:p>
+            <a:endParaRPr lang="en-US" dirty="0"/>
+          </a:p>
+        </p:txBody>
+      </p:sp>
+    </p:spTree>
+    <p:extLst>
+      <p:ext uri="{BB962C8B-B14F-4D97-AF65-F5344CB8AC3E}">
+        <p14:creationId xmlns:p14="http://schemas.microsoft.com/office/powerpoint/2010/main" val="2804711085"/>
+      </p:ext>
+    </p:extLst>
+  </p:cSld>
+  <p:clrMapOvr>
+    <a:masterClrMapping/>
+  </p:clrMapOvr>
+</p:sld>
+</file>
+
+<file path=ppt/slides/slide7.xml><?xml version="1.0" encoding="utf-8"?>
+<p:sld xmlns:a="http://schemas.openxmlformats.org/drawingml/2006/main" xmlns:r="http://schemas.openxmlformats.org/officeDocument/2006/relationships" xmlns:p="http://schemas.openxmlformats.org/presentationml/2006/main">
+  <p:cSld>
+    <p:spTree>
+      <p:nvGrpSpPr>
+        <p:cNvPr id="1" name=""/>
+        <p:cNvGrpSpPr/>
+        <p:nvPr/>
+      </p:nvGrpSpPr>
+      <p:grpSpPr>
+        <a:xfrm>
+          <a:off x="0" y="0"/>
+          <a:ext cx="0" cy="0"/>
+          <a:chOff x="0" y="0"/>
+          <a:chExt cx="0" cy="0"/>
+        </a:xfrm>
+      </p:grpSpPr>
+      <p:sp>
+        <p:nvSpPr>
+          <p:cNvPr id="3" name="Content Placeholder 2">
+            <a:extLst>
+              <a:ext uri="{FF2B5EF4-FFF2-40B4-BE49-F238E27FC236}">
+                <a16:creationId xmlns:a16="http://schemas.microsoft.com/office/drawing/2014/main" id="{E902EB0D-35F6-4B2C-B746-80E72390CBBF}"/>
+              </a:ext>
+            </a:extLst>
+          </p:cNvPr>
+          <p:cNvSpPr>
+            <a:spLocks noGrp="1"/>
+          </p:cNvSpPr>
+          <p:nvPr>
+            <p:ph idx="1"/>
+          </p:nvPr>
+        </p:nvSpPr>
+        <p:spPr>
+          <a:xfrm>
+            <a:off x="137160" y="169545"/>
+            <a:ext cx="11917680" cy="4351338"/>
+          </a:xfrm>
+        </p:spPr>
+        <p:txBody>
+          <a:bodyPr>
+            <a:normAutofit/>
+          </a:bodyPr>
+          <a:lstStyle/>
+          <a:p>
+            <a:pPr marL="0" indent="0">
+              <a:buNone/>
+            </a:pPr>
+            <a:r>
+              <a:rPr lang="en-US" sz="2400" dirty="0">
+                <a:latin typeface="Consolas" panose="020B0609020204030204" pitchFamily="49" charset="0"/>
+              </a:rPr>
+              <a:t>(define powerset</a:t>
+            </a:r>
+          </a:p>
+          <a:p>
+            <a:pPr marL="0" indent="0">
+              <a:buNone/>
+            </a:pPr>
+            <a:r>
+              <a:rPr lang="en-US" sz="2400" dirty="0">
+                <a:latin typeface="Consolas" panose="020B0609020204030204" pitchFamily="49" charset="0"/>
+              </a:rPr>
+              <a:t>  (lambda (</a:t>
+            </a:r>
+            <a:r>
+              <a:rPr lang="en-US" sz="2400" dirty="0" err="1">
+                <a:latin typeface="Consolas" panose="020B0609020204030204" pitchFamily="49" charset="0"/>
+              </a:rPr>
+              <a:t>lst</a:t>
+            </a:r>
+            <a:r>
+              <a:rPr lang="en-US" sz="2400" dirty="0">
+                <a:latin typeface="Consolas" panose="020B0609020204030204" pitchFamily="49" charset="0"/>
+              </a:rPr>
+              <a:t>)</a:t>
+            </a:r>
+          </a:p>
+          <a:p>
+            <a:pPr marL="0" indent="0">
+              <a:buNone/>
+            </a:pPr>
+            <a:r>
+              <a:rPr lang="en-US" sz="2400" dirty="0">
+                <a:latin typeface="Consolas" panose="020B0609020204030204" pitchFamily="49" charset="0"/>
+              </a:rPr>
+              <a:t>    (if (null? </a:t>
+            </a:r>
+            <a:r>
+              <a:rPr lang="en-US" sz="2400" dirty="0" err="1">
+                <a:latin typeface="Consolas" panose="020B0609020204030204" pitchFamily="49" charset="0"/>
+              </a:rPr>
+              <a:t>lst</a:t>
+            </a:r>
+            <a:r>
+              <a:rPr lang="en-US" sz="2400" dirty="0">
+                <a:latin typeface="Consolas" panose="020B0609020204030204" pitchFamily="49" charset="0"/>
+              </a:rPr>
+              <a:t>)</a:t>
+            </a:r>
+          </a:p>
+          <a:p>
+            <a:pPr marL="0" indent="0">
+              <a:buNone/>
+            </a:pPr>
+            <a:r>
+              <a:rPr lang="en-US" sz="2400" dirty="0">
+                <a:latin typeface="Consolas" panose="020B0609020204030204" pitchFamily="49" charset="0"/>
+              </a:rPr>
+              <a:t>        '(())</a:t>
+            </a:r>
+          </a:p>
+          <a:p>
+            <a:pPr marL="0" indent="0">
+              <a:buNone/>
+            </a:pPr>
+            <a:r>
+              <a:rPr lang="en-US" sz="2400" dirty="0">
+                <a:latin typeface="Consolas" panose="020B0609020204030204" pitchFamily="49" charset="0"/>
+              </a:rPr>
+              <a:t>        (let* ((sub-powerset (powerset (</a:t>
+            </a:r>
+            <a:r>
+              <a:rPr lang="en-US" sz="2400" dirty="0" err="1">
+                <a:latin typeface="Consolas" panose="020B0609020204030204" pitchFamily="49" charset="0"/>
+              </a:rPr>
+              <a:t>cdr</a:t>
+            </a:r>
+            <a:r>
+              <a:rPr lang="en-US" sz="2400" dirty="0">
+                <a:latin typeface="Consolas" panose="020B0609020204030204" pitchFamily="49" charset="0"/>
+              </a:rPr>
+              <a:t> </a:t>
+            </a:r>
+            <a:r>
+              <a:rPr lang="en-US" sz="2400" dirty="0" err="1">
+                <a:latin typeface="Consolas" panose="020B0609020204030204" pitchFamily="49" charset="0"/>
+              </a:rPr>
+              <a:t>lst</a:t>
+            </a:r>
+            <a:r>
+              <a:rPr lang="en-US" sz="2400" dirty="0">
+                <a:latin typeface="Consolas" panose="020B0609020204030204" pitchFamily="49" charset="0"/>
+              </a:rPr>
+              <a:t>)))</a:t>
+            </a:r>
+          </a:p>
+          <a:p>
+            <a:pPr marL="0" indent="0">
+              <a:buNone/>
+            </a:pPr>
+            <a:r>
+              <a:rPr lang="en-US" sz="2400" dirty="0">
+                <a:latin typeface="Consolas" panose="020B0609020204030204" pitchFamily="49" charset="0"/>
+              </a:rPr>
+              <a:t>               (sub-powerset-with-car (prepend-to-all (car </a:t>
+            </a:r>
+            <a:r>
+              <a:rPr lang="en-US" sz="2400" dirty="0" err="1">
+                <a:latin typeface="Consolas" panose="020B0609020204030204" pitchFamily="49" charset="0"/>
+              </a:rPr>
+              <a:t>lst</a:t>
+            </a:r>
+            <a:r>
+              <a:rPr lang="en-US" sz="2400" dirty="0">
+                <a:latin typeface="Consolas" panose="020B0609020204030204" pitchFamily="49" charset="0"/>
+              </a:rPr>
+              <a:t>)</a:t>
+            </a:r>
+          </a:p>
+          <a:p>
+            <a:pPr marL="0" indent="0">
+              <a:buNone/>
+            </a:pPr>
+            <a:r>
+              <a:rPr lang="en-US" sz="2400" dirty="0">
+                <a:latin typeface="Consolas" panose="020B0609020204030204" pitchFamily="49" charset="0"/>
+              </a:rPr>
+              <a:t>                                                      sub-powerset)))</a:t>
+            </a:r>
+          </a:p>
+          <a:p>
+            <a:pPr marL="0" indent="0">
+              <a:buNone/>
+            </a:pPr>
+            <a:r>
+              <a:rPr lang="en-US" sz="2400" dirty="0">
+                <a:latin typeface="Consolas" panose="020B0609020204030204" pitchFamily="49" charset="0"/>
+              </a:rPr>
+              <a:t>          (append sub-powerset sub-powerset-with-car)))))</a:t>
+            </a:r>
+          </a:p>
+        </p:txBody>
+      </p:sp>
+      <p:sp>
+        <p:nvSpPr>
+          <p:cNvPr id="4" name="TextBox 3">
+            <a:extLst>
+              <a:ext uri="{FF2B5EF4-FFF2-40B4-BE49-F238E27FC236}">
+                <a16:creationId xmlns:a16="http://schemas.microsoft.com/office/drawing/2014/main" id="{2D39F944-DC3D-4B85-A2E8-32C870C94452}"/>
+              </a:ext>
+            </a:extLst>
+          </p:cNvPr>
+          <p:cNvSpPr txBox="1"/>
+          <p:nvPr/>
+        </p:nvSpPr>
+        <p:spPr>
+          <a:xfrm>
+            <a:off x="1381760" y="4846320"/>
+            <a:ext cx="7345680" cy="1631216"/>
+          </a:xfrm>
+          <a:prstGeom prst="rect">
+            <a:avLst/>
+          </a:prstGeom>
+          <a:noFill/>
+        </p:spPr>
+        <p:txBody>
+          <a:bodyPr wrap="square" rtlCol="0">
+            <a:spAutoFit/>
+          </a:bodyPr>
+          <a:lstStyle/>
+          <a:p>
+            <a:r>
+              <a:rPr lang="en-US" sz="2000" dirty="0"/>
+              <a:t>The algorithm:</a:t>
+            </a:r>
+          </a:p>
+          <a:p>
+            <a:r>
+              <a:rPr lang="en-US" sz="2000" dirty="0"/>
+              <a:t>Step 0.  Check if solution is trivial…if not…</a:t>
+            </a:r>
+          </a:p>
+          <a:p>
+            <a:r>
+              <a:rPr lang="en-US" sz="2000" dirty="0"/>
+              <a:t>Step 1.  Calculate the powerset of the </a:t>
+            </a:r>
+            <a:r>
+              <a:rPr lang="en-US" sz="2000" dirty="0" err="1"/>
+              <a:t>cdr</a:t>
+            </a:r>
+            <a:r>
+              <a:rPr lang="en-US" sz="2000" dirty="0"/>
+              <a:t> (sub-powerset)</a:t>
+            </a:r>
+          </a:p>
+          <a:p>
+            <a:r>
+              <a:rPr lang="en-US" sz="2000" dirty="0"/>
+              <a:t>Step 2.  Part the car to each entry (sub-powerset-with-car)</a:t>
+            </a:r>
+          </a:p>
+          <a:p>
+            <a:r>
+              <a:rPr lang="en-US" sz="2000" dirty="0"/>
+              <a:t>Step 3.  Append sub-powerset and sub-powerset-with-car together</a:t>
+            </a:r>
+          </a:p>
+        </p:txBody>
+      </p:sp>
+    </p:spTree>
+    <p:extLst>
+      <p:ext uri="{BB962C8B-B14F-4D97-AF65-F5344CB8AC3E}">
+        <p14:creationId xmlns:p14="http://schemas.microsoft.com/office/powerpoint/2010/main" val="335906857"/>
+      </p:ext>
+    </p:extLst>
+  </p:cSld>
+  <p:clrMapOvr>
+    <a:masterClrMapping/>
+  </p:clrMapOvr>
+</p:sld>
+</file>
+
+<file path=ppt/slides/slide8.xml><?xml version="1.0" encoding="utf-8"?>
+<p:sld xmlns:a="http://schemas.openxmlformats.org/drawingml/2006/main" xmlns:r="http://schemas.openxmlformats.org/officeDocument/2006/relationships" xmlns:p="http://schemas.openxmlformats.org/presentationml/2006/main">
+  <p:cSld>
+    <p:spTree>
+      <p:nvGrpSpPr>
+        <p:cNvPr id="1" name=""/>
+        <p:cNvGrpSpPr/>
+        <p:nvPr/>
+      </p:nvGrpSpPr>
+      <p:grpSpPr>
+        <a:xfrm>
+          <a:off x="0" y="0"/>
+          <a:ext cx="0" cy="0"/>
+          <a:chOff x="0" y="0"/>
+          <a:chExt cx="0" cy="0"/>
+        </a:xfrm>
+      </p:grpSpPr>
+      <p:sp>
+        <p:nvSpPr>
+          <p:cNvPr id="2" name="Title 1">
+            <a:extLst>
+              <a:ext uri="{FF2B5EF4-FFF2-40B4-BE49-F238E27FC236}">
                 <a16:creationId xmlns:a16="http://schemas.microsoft.com/office/drawing/2014/main" id="{CCDB98A2-ADF6-49CF-B2F7-7A16D8E3FFEE}"/>
               </a:ext>
             </a:extLst>
@@ -4510,7 +4736,7 @@
 </p:sld>
 </file>
 
-<file path=ppt/slides/slide7.xml><?xml version="1.0" encoding="utf-8"?>
+<file path=ppt/slides/slide9.xml><?xml version="1.0" encoding="utf-8"?>
 <p:sld xmlns:a="http://schemas.openxmlformats.org/drawingml/2006/main" xmlns:r="http://schemas.openxmlformats.org/officeDocument/2006/relationships" xmlns:p="http://schemas.openxmlformats.org/presentationml/2006/main">
   <p:cSld>
     <p:spTree>

</xml_diff>

<commit_message>
new version of CPS slides
</commit_message>
<xml_diff>
--- a/ClassMaterials/CPS/CPS intro.pptx
+++ b/ClassMaterials/CPS/CPS intro.pptx
@@ -8,12 +8,11 @@
     <p:sldId id="256" r:id="rId2"/>
     <p:sldId id="263" r:id="rId3"/>
     <p:sldId id="264" r:id="rId4"/>
-    <p:sldId id="257" r:id="rId5"/>
-    <p:sldId id="258" r:id="rId6"/>
-    <p:sldId id="259" r:id="rId7"/>
-    <p:sldId id="260" r:id="rId8"/>
-    <p:sldId id="261" r:id="rId9"/>
-    <p:sldId id="262" r:id="rId10"/>
+    <p:sldId id="265" r:id="rId5"/>
+    <p:sldId id="266" r:id="rId6"/>
+    <p:sldId id="267" r:id="rId7"/>
+    <p:sldId id="261" r:id="rId8"/>
+    <p:sldId id="262" r:id="rId9"/>
   </p:sldIdLst>
   <p:sldSz cx="12192000" cy="6858000"/>
   <p:notesSz cx="6858000" cy="9144000"/>
@@ -267,7 +266,7 @@
           <a:p>
             <a:fld id="{9440ADD7-BD8E-48E1-A930-9BA64A1DD9A7}" type="datetimeFigureOut">
               <a:rPr lang="en-US" smtClean="0"/>
-              <a:t>10/13/2023</a:t>
+              <a:t>1/19/2024</a:t>
             </a:fld>
             <a:endParaRPr lang="en-US"/>
           </a:p>
@@ -465,7 +464,7 @@
           <a:p>
             <a:fld id="{9440ADD7-BD8E-48E1-A930-9BA64A1DD9A7}" type="datetimeFigureOut">
               <a:rPr lang="en-US" smtClean="0"/>
-              <a:t>10/13/2023</a:t>
+              <a:t>1/19/2024</a:t>
             </a:fld>
             <a:endParaRPr lang="en-US"/>
           </a:p>
@@ -673,7 +672,7 @@
           <a:p>
             <a:fld id="{9440ADD7-BD8E-48E1-A930-9BA64A1DD9A7}" type="datetimeFigureOut">
               <a:rPr lang="en-US" smtClean="0"/>
-              <a:t>10/13/2023</a:t>
+              <a:t>1/19/2024</a:t>
             </a:fld>
             <a:endParaRPr lang="en-US"/>
           </a:p>
@@ -871,7 +870,7 @@
           <a:p>
             <a:fld id="{9440ADD7-BD8E-48E1-A930-9BA64A1DD9A7}" type="datetimeFigureOut">
               <a:rPr lang="en-US" smtClean="0"/>
-              <a:t>10/13/2023</a:t>
+              <a:t>1/19/2024</a:t>
             </a:fld>
             <a:endParaRPr lang="en-US"/>
           </a:p>
@@ -1146,7 +1145,7 @@
           <a:p>
             <a:fld id="{9440ADD7-BD8E-48E1-A930-9BA64A1DD9A7}" type="datetimeFigureOut">
               <a:rPr lang="en-US" smtClean="0"/>
-              <a:t>10/13/2023</a:t>
+              <a:t>1/19/2024</a:t>
             </a:fld>
             <a:endParaRPr lang="en-US"/>
           </a:p>
@@ -1411,7 +1410,7 @@
           <a:p>
             <a:fld id="{9440ADD7-BD8E-48E1-A930-9BA64A1DD9A7}" type="datetimeFigureOut">
               <a:rPr lang="en-US" smtClean="0"/>
-              <a:t>10/13/2023</a:t>
+              <a:t>1/19/2024</a:t>
             </a:fld>
             <a:endParaRPr lang="en-US"/>
           </a:p>
@@ -1823,7 +1822,7 @@
           <a:p>
             <a:fld id="{9440ADD7-BD8E-48E1-A930-9BA64A1DD9A7}" type="datetimeFigureOut">
               <a:rPr lang="en-US" smtClean="0"/>
-              <a:t>10/13/2023</a:t>
+              <a:t>1/19/2024</a:t>
             </a:fld>
             <a:endParaRPr lang="en-US"/>
           </a:p>
@@ -1964,7 +1963,7 @@
           <a:p>
             <a:fld id="{9440ADD7-BD8E-48E1-A930-9BA64A1DD9A7}" type="datetimeFigureOut">
               <a:rPr lang="en-US" smtClean="0"/>
-              <a:t>10/13/2023</a:t>
+              <a:t>1/19/2024</a:t>
             </a:fld>
             <a:endParaRPr lang="en-US"/>
           </a:p>
@@ -2077,7 +2076,7 @@
           <a:p>
             <a:fld id="{9440ADD7-BD8E-48E1-A930-9BA64A1DD9A7}" type="datetimeFigureOut">
               <a:rPr lang="en-US" smtClean="0"/>
-              <a:t>10/13/2023</a:t>
+              <a:t>1/19/2024</a:t>
             </a:fld>
             <a:endParaRPr lang="en-US"/>
           </a:p>
@@ -2388,7 +2387,7 @@
           <a:p>
             <a:fld id="{9440ADD7-BD8E-48E1-A930-9BA64A1DD9A7}" type="datetimeFigureOut">
               <a:rPr lang="en-US" smtClean="0"/>
-              <a:t>10/13/2023</a:t>
+              <a:t>1/19/2024</a:t>
             </a:fld>
             <a:endParaRPr lang="en-US"/>
           </a:p>
@@ -2676,7 +2675,7 @@
           <a:p>
             <a:fld id="{9440ADD7-BD8E-48E1-A930-9BA64A1DD9A7}" type="datetimeFigureOut">
               <a:rPr lang="en-US" smtClean="0"/>
-              <a:t>10/13/2023</a:t>
+              <a:t>1/19/2024</a:t>
             </a:fld>
             <a:endParaRPr lang="en-US"/>
           </a:p>
@@ -2917,7 +2916,7 @@
           <a:p>
             <a:fld id="{9440ADD7-BD8E-48E1-A930-9BA64A1DD9A7}" type="datetimeFigureOut">
               <a:rPr lang="en-US" smtClean="0"/>
-              <a:t>10/13/2023</a:t>
+              <a:t>1/19/2024</a:t>
             </a:fld>
             <a:endParaRPr lang="en-US"/>
           </a:p>
@@ -3644,7 +3643,7 @@
           <p:cNvPr id="2" name="Title 1">
             <a:extLst>
               <a:ext uri="{FF2B5EF4-FFF2-40B4-BE49-F238E27FC236}">
-                <a16:creationId xmlns:a16="http://schemas.microsoft.com/office/drawing/2014/main" id="{D947CD4C-A172-4C36-92D7-ECE317EBA0D4}"/>
+                <a16:creationId xmlns:a16="http://schemas.microsoft.com/office/drawing/2014/main" id="{B2CA12B1-ECB1-4529-A17E-B502476BECEF}"/>
               </a:ext>
             </a:extLst>
           </p:cNvPr>
@@ -3662,231 +3661,45 @@
           <a:p>
             <a:r>
               <a:rPr lang="en-US" dirty="0"/>
-              <a:t>Exercise</a:t>
-            </a:r>
-          </a:p>
-        </p:txBody>
-      </p:sp>
-      <p:sp>
-        <p:nvSpPr>
-          <p:cNvPr id="3" name="Content Placeholder 2">
-            <a:extLst>
-              <a:ext uri="{FF2B5EF4-FFF2-40B4-BE49-F238E27FC236}">
-                <a16:creationId xmlns:a16="http://schemas.microsoft.com/office/drawing/2014/main" id="{EA20BE43-41AC-4E14-9C27-8B4B7AF073E0}"/>
-              </a:ext>
-            </a:extLst>
-          </p:cNvPr>
-          <p:cNvSpPr>
-            <a:spLocks noGrp="1"/>
-          </p:cNvSpPr>
-          <p:nvPr>
-            <p:ph idx="1"/>
-          </p:nvPr>
-        </p:nvSpPr>
-        <p:spPr/>
-        <p:txBody>
-          <a:bodyPr>
-            <a:normAutofit lnSpcReduction="10000"/>
-          </a:bodyPr>
-          <a:lstStyle/>
-          <a:p>
-            <a:pPr marL="0" indent="0">
-              <a:buNone/>
-            </a:pPr>
-            <a:endParaRPr lang="en-US" dirty="0"/>
-          </a:p>
-          <a:p>
-            <a:pPr marL="0" indent="0">
-              <a:buNone/>
-            </a:pPr>
-            <a:r>
-              <a:rPr lang="en-US" dirty="0">
-                <a:latin typeface="Consolas" panose="020B0609020204030204" pitchFamily="49" charset="0"/>
-              </a:rPr>
-              <a:t>(define prepend-to-all</a:t>
-            </a:r>
-          </a:p>
-          <a:p>
-            <a:pPr marL="0" indent="0">
-              <a:buNone/>
-            </a:pPr>
-            <a:r>
-              <a:rPr lang="en-US" dirty="0">
-                <a:latin typeface="Consolas" panose="020B0609020204030204" pitchFamily="49" charset="0"/>
-              </a:rPr>
-              <a:t>  (lambda (</a:t>
-            </a:r>
-            <a:r>
-              <a:rPr lang="en-US" dirty="0" err="1">
-                <a:latin typeface="Consolas" panose="020B0609020204030204" pitchFamily="49" charset="0"/>
-              </a:rPr>
-              <a:t>val</a:t>
-            </a:r>
-            <a:r>
-              <a:rPr lang="en-US" dirty="0">
-                <a:latin typeface="Consolas" panose="020B0609020204030204" pitchFamily="49" charset="0"/>
-              </a:rPr>
-              <a:t> </a:t>
-            </a:r>
-            <a:r>
-              <a:rPr lang="en-US" dirty="0" err="1">
-                <a:latin typeface="Consolas" panose="020B0609020204030204" pitchFamily="49" charset="0"/>
-              </a:rPr>
-              <a:t>lst</a:t>
-            </a:r>
-            <a:r>
-              <a:rPr lang="en-US" dirty="0">
-                <a:latin typeface="Consolas" panose="020B0609020204030204" pitchFamily="49" charset="0"/>
-              </a:rPr>
-              <a:t>)</a:t>
-            </a:r>
-          </a:p>
-          <a:p>
-            <a:pPr marL="0" indent="0">
-              <a:buNone/>
-            </a:pPr>
-            <a:r>
-              <a:rPr lang="en-US" dirty="0">
-                <a:latin typeface="Consolas" panose="020B0609020204030204" pitchFamily="49" charset="0"/>
-              </a:rPr>
-              <a:t>    (if (null? </a:t>
-            </a:r>
-            <a:r>
-              <a:rPr lang="en-US" dirty="0" err="1">
-                <a:latin typeface="Consolas" panose="020B0609020204030204" pitchFamily="49" charset="0"/>
-              </a:rPr>
-              <a:t>lst</a:t>
-            </a:r>
-            <a:r>
-              <a:rPr lang="en-US" dirty="0">
-                <a:latin typeface="Consolas" panose="020B0609020204030204" pitchFamily="49" charset="0"/>
-              </a:rPr>
-              <a:t>)</a:t>
-            </a:r>
-          </a:p>
-          <a:p>
-            <a:pPr marL="0" indent="0">
-              <a:buNone/>
-            </a:pPr>
-            <a:r>
-              <a:rPr lang="en-US" dirty="0">
-                <a:latin typeface="Consolas" panose="020B0609020204030204" pitchFamily="49" charset="0"/>
-              </a:rPr>
-              <a:t>        </a:t>
-            </a:r>
-            <a:r>
-              <a:rPr lang="en-US" dirty="0" err="1">
-                <a:latin typeface="Consolas" panose="020B0609020204030204" pitchFamily="49" charset="0"/>
-              </a:rPr>
-              <a:t>lst</a:t>
-            </a:r>
-            <a:endParaRPr lang="en-US" dirty="0">
-              <a:latin typeface="Consolas" panose="020B0609020204030204" pitchFamily="49" charset="0"/>
-            </a:endParaRPr>
-          </a:p>
-          <a:p>
-            <a:pPr marL="0" indent="0">
-              <a:buNone/>
-            </a:pPr>
-            <a:r>
-              <a:rPr lang="en-US" dirty="0">
-                <a:latin typeface="Consolas" panose="020B0609020204030204" pitchFamily="49" charset="0"/>
-              </a:rPr>
-              <a:t>        (cons (cons </a:t>
-            </a:r>
-            <a:r>
-              <a:rPr lang="en-US" dirty="0" err="1">
-                <a:latin typeface="Consolas" panose="020B0609020204030204" pitchFamily="49" charset="0"/>
-              </a:rPr>
-              <a:t>val</a:t>
-            </a:r>
-            <a:r>
-              <a:rPr lang="en-US" dirty="0">
-                <a:latin typeface="Consolas" panose="020B0609020204030204" pitchFamily="49" charset="0"/>
-              </a:rPr>
-              <a:t> (car </a:t>
-            </a:r>
-            <a:r>
-              <a:rPr lang="en-US" dirty="0" err="1">
-                <a:latin typeface="Consolas" panose="020B0609020204030204" pitchFamily="49" charset="0"/>
-              </a:rPr>
-              <a:t>lst</a:t>
-            </a:r>
-            <a:r>
-              <a:rPr lang="en-US" dirty="0">
-                <a:latin typeface="Consolas" panose="020B0609020204030204" pitchFamily="49" charset="0"/>
-              </a:rPr>
-              <a:t>))</a:t>
-            </a:r>
-          </a:p>
-          <a:p>
-            <a:pPr marL="0" indent="0">
-              <a:buNone/>
-            </a:pPr>
-            <a:r>
-              <a:rPr lang="en-US" dirty="0">
-                <a:latin typeface="Consolas" panose="020B0609020204030204" pitchFamily="49" charset="0"/>
-              </a:rPr>
-              <a:t>              (prepend-to-all </a:t>
-            </a:r>
-            <a:r>
-              <a:rPr lang="en-US" dirty="0" err="1">
-                <a:latin typeface="Consolas" panose="020B0609020204030204" pitchFamily="49" charset="0"/>
-              </a:rPr>
-              <a:t>val</a:t>
-            </a:r>
-            <a:r>
-              <a:rPr lang="en-US" dirty="0">
-                <a:latin typeface="Consolas" panose="020B0609020204030204" pitchFamily="49" charset="0"/>
-              </a:rPr>
-              <a:t> (</a:t>
-            </a:r>
-            <a:r>
-              <a:rPr lang="en-US" dirty="0" err="1">
-                <a:latin typeface="Consolas" panose="020B0609020204030204" pitchFamily="49" charset="0"/>
-              </a:rPr>
-              <a:t>cdr</a:t>
-            </a:r>
-            <a:r>
-              <a:rPr lang="en-US" dirty="0">
-                <a:latin typeface="Consolas" panose="020B0609020204030204" pitchFamily="49" charset="0"/>
-              </a:rPr>
-              <a:t> </a:t>
-            </a:r>
-            <a:r>
-              <a:rPr lang="en-US" dirty="0" err="1">
-                <a:latin typeface="Consolas" panose="020B0609020204030204" pitchFamily="49" charset="0"/>
-              </a:rPr>
-              <a:t>lst</a:t>
-            </a:r>
-            <a:r>
-              <a:rPr lang="en-US" dirty="0">
-                <a:latin typeface="Consolas" panose="020B0609020204030204" pitchFamily="49" charset="0"/>
-              </a:rPr>
-              <a:t>))))))</a:t>
-            </a:r>
-          </a:p>
-          <a:p>
-            <a:pPr marL="0" indent="0">
-              <a:buNone/>
-            </a:pPr>
-            <a:endParaRPr lang="en-US" dirty="0"/>
-          </a:p>
-          <a:p>
-            <a:pPr marL="0" indent="0">
-              <a:buNone/>
-            </a:pPr>
-            <a:r>
-              <a:rPr lang="en-US" dirty="0"/>
-              <a:t>Working with a neighbor, produce a tail recursive prepend-to-all</a:t>
-            </a:r>
-          </a:p>
-        </p:txBody>
-      </p:sp>
+              <a:t>What prevents us from making this tail-recursive?</a:t>
+            </a:r>
+          </a:p>
+        </p:txBody>
+      </p:sp>
+      <p:pic>
+        <p:nvPicPr>
+          <p:cNvPr id="4" name="Picture 3">
+            <a:extLst>
+              <a:ext uri="{FF2B5EF4-FFF2-40B4-BE49-F238E27FC236}">
+                <a16:creationId xmlns:a16="http://schemas.microsoft.com/office/drawing/2014/main" id="{67F454A9-8464-4162-B29C-A597128E05E6}"/>
+              </a:ext>
+            </a:extLst>
+          </p:cNvPr>
+          <p:cNvPicPr>
+            <a:picLocks noChangeAspect="1"/>
+          </p:cNvPicPr>
+          <p:nvPr/>
+        </p:nvPicPr>
+        <p:blipFill>
+          <a:blip r:embed="rId2"/>
+          <a:stretch>
+            <a:fillRect/>
+          </a:stretch>
+        </p:blipFill>
+        <p:spPr>
+          <a:xfrm>
+            <a:off x="599308" y="1847629"/>
+            <a:ext cx="10993384" cy="3162741"/>
+          </a:xfrm>
+          <a:prstGeom prst="rect">
+            <a:avLst/>
+          </a:prstGeom>
+        </p:spPr>
+      </p:pic>
     </p:spTree>
     <p:extLst>
       <p:ext uri="{BB962C8B-B14F-4D97-AF65-F5344CB8AC3E}">
-        <p14:creationId xmlns:p14="http://schemas.microsoft.com/office/powerpoint/2010/main" val="2577802896"/>
+        <p14:creationId xmlns:p14="http://schemas.microsoft.com/office/powerpoint/2010/main" val="3569441302"/>
       </p:ext>
     </p:extLst>
   </p:cSld>
@@ -3915,256 +3728,115 @@
       </p:grpSpPr>
       <p:sp>
         <p:nvSpPr>
-          <p:cNvPr id="3" name="Content Placeholder 2">
-            <a:extLst>
-              <a:ext uri="{FF2B5EF4-FFF2-40B4-BE49-F238E27FC236}">
-                <a16:creationId xmlns:a16="http://schemas.microsoft.com/office/drawing/2014/main" id="{3E0EA865-AD75-42EA-84EC-D70E5BBB97EE}"/>
-              </a:ext>
-            </a:extLst>
-          </p:cNvPr>
-          <p:cNvSpPr>
-            <a:spLocks noGrp="1"/>
-          </p:cNvSpPr>
-          <p:nvPr>
-            <p:ph idx="1"/>
+          <p:cNvPr id="2" name="Title 1">
+            <a:extLst>
+              <a:ext uri="{FF2B5EF4-FFF2-40B4-BE49-F238E27FC236}">
+                <a16:creationId xmlns:a16="http://schemas.microsoft.com/office/drawing/2014/main" id="{B2CA12B1-ECB1-4529-A17E-B502476BECEF}"/>
+              </a:ext>
+            </a:extLst>
+          </p:cNvPr>
+          <p:cNvSpPr>
+            <a:spLocks noGrp="1"/>
+          </p:cNvSpPr>
+          <p:nvPr>
+            <p:ph type="title"/>
           </p:nvPr>
         </p:nvSpPr>
         <p:spPr>
           <a:xfrm>
-            <a:off x="838200" y="1155065"/>
-            <a:ext cx="10515600" cy="4351338"/>
+            <a:off x="506993" y="365125"/>
+            <a:ext cx="11262511" cy="1325563"/>
           </a:xfrm>
         </p:spPr>
         <p:txBody>
           <a:bodyPr/>
           <a:lstStyle/>
           <a:p>
-            <a:pPr marL="0" indent="0">
-              <a:buNone/>
-            </a:pPr>
-            <a:r>
-              <a:rPr lang="en-US" dirty="0">
-                <a:latin typeface="Consolas" panose="020B0609020204030204" pitchFamily="49" charset="0"/>
-              </a:rPr>
-              <a:t>(define prepend-to-all-tail</a:t>
-            </a:r>
-          </a:p>
-          <a:p>
-            <a:pPr marL="0" indent="0">
-              <a:buNone/>
-            </a:pPr>
-            <a:r>
-              <a:rPr lang="en-US" dirty="0">
-                <a:latin typeface="Consolas" panose="020B0609020204030204" pitchFamily="49" charset="0"/>
-              </a:rPr>
-              <a:t>  (lambda (</a:t>
-            </a:r>
-            <a:r>
-              <a:rPr lang="en-US" dirty="0" err="1">
-                <a:latin typeface="Consolas" panose="020B0609020204030204" pitchFamily="49" charset="0"/>
-              </a:rPr>
-              <a:t>val</a:t>
-            </a:r>
-            <a:r>
-              <a:rPr lang="en-US" dirty="0">
-                <a:latin typeface="Consolas" panose="020B0609020204030204" pitchFamily="49" charset="0"/>
-              </a:rPr>
-              <a:t> </a:t>
-            </a:r>
-            <a:r>
-              <a:rPr lang="en-US" dirty="0" err="1">
-                <a:latin typeface="Consolas" panose="020B0609020204030204" pitchFamily="49" charset="0"/>
-              </a:rPr>
-              <a:t>lst</a:t>
-            </a:r>
-            <a:r>
-              <a:rPr lang="en-US" dirty="0">
-                <a:latin typeface="Consolas" panose="020B0609020204030204" pitchFamily="49" charset="0"/>
-              </a:rPr>
-              <a:t> acc)</a:t>
-            </a:r>
-          </a:p>
-          <a:p>
-            <a:pPr marL="0" indent="0">
-              <a:buNone/>
-            </a:pPr>
-            <a:r>
-              <a:rPr lang="en-US" dirty="0">
-                <a:latin typeface="Consolas" panose="020B0609020204030204" pitchFamily="49" charset="0"/>
-              </a:rPr>
-              <a:t>    (if (null? </a:t>
-            </a:r>
-            <a:r>
-              <a:rPr lang="en-US" dirty="0" err="1">
-                <a:latin typeface="Consolas" panose="020B0609020204030204" pitchFamily="49" charset="0"/>
-              </a:rPr>
-              <a:t>lst</a:t>
-            </a:r>
-            <a:r>
-              <a:rPr lang="en-US" dirty="0">
-                <a:latin typeface="Consolas" panose="020B0609020204030204" pitchFamily="49" charset="0"/>
-              </a:rPr>
-              <a:t>)</a:t>
-            </a:r>
-          </a:p>
-          <a:p>
-            <a:pPr marL="0" indent="0">
-              <a:buNone/>
-            </a:pPr>
-            <a:r>
-              <a:rPr lang="en-US" dirty="0">
-                <a:latin typeface="Consolas" panose="020B0609020204030204" pitchFamily="49" charset="0"/>
-              </a:rPr>
-              <a:t>        </a:t>
-            </a:r>
-            <a:r>
-              <a:rPr lang="en-US" b="1" dirty="0">
-                <a:solidFill>
-                  <a:schemeClr val="accent2">
-                    <a:lumMod val="75000"/>
-                  </a:schemeClr>
-                </a:solidFill>
-                <a:latin typeface="Consolas" panose="020B0609020204030204" pitchFamily="49" charset="0"/>
-              </a:rPr>
-              <a:t>(reverse acc)</a:t>
-            </a:r>
-          </a:p>
-          <a:p>
-            <a:pPr marL="0" indent="0">
-              <a:buNone/>
-            </a:pPr>
-            <a:r>
-              <a:rPr lang="en-US" dirty="0">
-                <a:latin typeface="Consolas" panose="020B0609020204030204" pitchFamily="49" charset="0"/>
-              </a:rPr>
-              <a:t>        (prepend-to-all-tail</a:t>
-            </a:r>
-          </a:p>
-          <a:p>
-            <a:pPr marL="0" indent="0">
-              <a:buNone/>
-            </a:pPr>
-            <a:r>
-              <a:rPr lang="en-US" dirty="0">
-                <a:latin typeface="Consolas" panose="020B0609020204030204" pitchFamily="49" charset="0"/>
-              </a:rPr>
-              <a:t>         </a:t>
-            </a:r>
-            <a:r>
-              <a:rPr lang="en-US" dirty="0" err="1">
-                <a:latin typeface="Consolas" panose="020B0609020204030204" pitchFamily="49" charset="0"/>
-              </a:rPr>
-              <a:t>val</a:t>
-            </a:r>
-            <a:endParaRPr lang="en-US" dirty="0">
-              <a:latin typeface="Consolas" panose="020B0609020204030204" pitchFamily="49" charset="0"/>
-            </a:endParaRPr>
-          </a:p>
-          <a:p>
-            <a:pPr marL="0" indent="0">
-              <a:buNone/>
-            </a:pPr>
-            <a:r>
-              <a:rPr lang="en-US" dirty="0">
-                <a:latin typeface="Consolas" panose="020B0609020204030204" pitchFamily="49" charset="0"/>
-              </a:rPr>
-              <a:t>         (</a:t>
-            </a:r>
-            <a:r>
-              <a:rPr lang="en-US" dirty="0" err="1">
-                <a:latin typeface="Consolas" panose="020B0609020204030204" pitchFamily="49" charset="0"/>
-              </a:rPr>
-              <a:t>cdr</a:t>
-            </a:r>
-            <a:r>
-              <a:rPr lang="en-US" dirty="0">
-                <a:latin typeface="Consolas" panose="020B0609020204030204" pitchFamily="49" charset="0"/>
-              </a:rPr>
-              <a:t> </a:t>
-            </a:r>
-            <a:r>
-              <a:rPr lang="en-US" dirty="0" err="1">
-                <a:latin typeface="Consolas" panose="020B0609020204030204" pitchFamily="49" charset="0"/>
-              </a:rPr>
-              <a:t>lst</a:t>
-            </a:r>
-            <a:r>
-              <a:rPr lang="en-US" dirty="0">
-                <a:latin typeface="Consolas" panose="020B0609020204030204" pitchFamily="49" charset="0"/>
-              </a:rPr>
-              <a:t>)</a:t>
-            </a:r>
-          </a:p>
-          <a:p>
-            <a:pPr marL="0" indent="0">
-              <a:buNone/>
-            </a:pPr>
-            <a:r>
-              <a:rPr lang="en-US" dirty="0">
-                <a:latin typeface="Consolas" panose="020B0609020204030204" pitchFamily="49" charset="0"/>
-              </a:rPr>
-              <a:t>         </a:t>
-            </a:r>
-            <a:r>
-              <a:rPr lang="en-US" b="1" dirty="0">
-                <a:solidFill>
-                  <a:schemeClr val="accent1"/>
-                </a:solidFill>
-                <a:latin typeface="Consolas" panose="020B0609020204030204" pitchFamily="49" charset="0"/>
-              </a:rPr>
-              <a:t>(cons (cons </a:t>
-            </a:r>
-            <a:r>
-              <a:rPr lang="en-US" b="1" dirty="0" err="1">
-                <a:solidFill>
-                  <a:schemeClr val="accent1"/>
-                </a:solidFill>
-                <a:latin typeface="Consolas" panose="020B0609020204030204" pitchFamily="49" charset="0"/>
-              </a:rPr>
-              <a:t>val</a:t>
-            </a:r>
-            <a:r>
-              <a:rPr lang="en-US" b="1" dirty="0">
-                <a:solidFill>
-                  <a:schemeClr val="accent1"/>
-                </a:solidFill>
-                <a:latin typeface="Consolas" panose="020B0609020204030204" pitchFamily="49" charset="0"/>
-              </a:rPr>
-              <a:t> (car </a:t>
-            </a:r>
-            <a:r>
-              <a:rPr lang="en-US" b="1" dirty="0" err="1">
-                <a:solidFill>
-                  <a:schemeClr val="accent1"/>
-                </a:solidFill>
-                <a:latin typeface="Consolas" panose="020B0609020204030204" pitchFamily="49" charset="0"/>
-              </a:rPr>
-              <a:t>lst</a:t>
-            </a:r>
-            <a:r>
-              <a:rPr lang="en-US" b="1" dirty="0">
-                <a:solidFill>
-                  <a:schemeClr val="accent1"/>
-                </a:solidFill>
-                <a:latin typeface="Consolas" panose="020B0609020204030204" pitchFamily="49" charset="0"/>
-              </a:rPr>
-              <a:t>)) acc)))</a:t>
-            </a:r>
-            <a:r>
-              <a:rPr lang="en-US" dirty="0">
-                <a:latin typeface="Consolas" panose="020B0609020204030204" pitchFamily="49" charset="0"/>
-              </a:rPr>
-              <a:t>))</a:t>
-            </a:r>
-          </a:p>
-        </p:txBody>
-      </p:sp>
-      <p:sp>
-        <p:nvSpPr>
-          <p:cNvPr id="6" name="Callout: Line 5">
-            <a:extLst>
-              <a:ext uri="{FF2B5EF4-FFF2-40B4-BE49-F238E27FC236}">
-                <a16:creationId xmlns:a16="http://schemas.microsoft.com/office/drawing/2014/main" id="{B0AB51F9-346A-4251-8993-60F63FC0420E}"/>
+            <a:r>
+              <a:rPr lang="en-US" dirty="0"/>
+              <a:t>Our recursive call must be the last thing we do</a:t>
+            </a:r>
+          </a:p>
+        </p:txBody>
+      </p:sp>
+      <p:pic>
+        <p:nvPicPr>
+          <p:cNvPr id="4" name="Picture 3">
+            <a:extLst>
+              <a:ext uri="{FF2B5EF4-FFF2-40B4-BE49-F238E27FC236}">
+                <a16:creationId xmlns:a16="http://schemas.microsoft.com/office/drawing/2014/main" id="{67F454A9-8464-4162-B29C-A597128E05E6}"/>
+              </a:ext>
+            </a:extLst>
+          </p:cNvPr>
+          <p:cNvPicPr>
+            <a:picLocks noChangeAspect="1"/>
+          </p:cNvPicPr>
+          <p:nvPr/>
+        </p:nvPicPr>
+        <p:blipFill>
+          <a:blip r:embed="rId2"/>
+          <a:stretch>
+            <a:fillRect/>
+          </a:stretch>
+        </p:blipFill>
+        <p:spPr>
+          <a:xfrm>
+            <a:off x="599308" y="1847629"/>
+            <a:ext cx="10993384" cy="3162741"/>
+          </a:xfrm>
+          <a:prstGeom prst="rect">
+            <a:avLst/>
+          </a:prstGeom>
+        </p:spPr>
+      </p:pic>
+      <p:cxnSp>
+        <p:nvCxnSpPr>
+          <p:cNvPr id="5" name="Straight Connector 4">
+            <a:extLst>
+              <a:ext uri="{FF2B5EF4-FFF2-40B4-BE49-F238E27FC236}">
+                <a16:creationId xmlns:a16="http://schemas.microsoft.com/office/drawing/2014/main" id="{8A24B0FB-0E4D-4D8F-AFB6-DA84A3DE580C}"/>
+              </a:ext>
+            </a:extLst>
+          </p:cNvPr>
+          <p:cNvCxnSpPr/>
+          <p:nvPr/>
+        </p:nvCxnSpPr>
+        <p:spPr>
+          <a:xfrm>
+            <a:off x="736348" y="4101220"/>
+            <a:ext cx="10719303" cy="0"/>
+          </a:xfrm>
+          <a:prstGeom prst="line">
+            <a:avLst/>
+          </a:prstGeom>
+          <a:ln w="19050">
+            <a:solidFill>
+              <a:schemeClr val="accent2"/>
+            </a:solidFill>
+            <a:prstDash val="lgDash"/>
+          </a:ln>
+        </p:spPr>
+        <p:style>
+          <a:lnRef idx="1">
+            <a:schemeClr val="accent1"/>
+          </a:lnRef>
+          <a:fillRef idx="0">
+            <a:schemeClr val="accent1"/>
+          </a:fillRef>
+          <a:effectRef idx="0">
+            <a:schemeClr val="accent1"/>
+          </a:effectRef>
+          <a:fontRef idx="minor">
+            <a:schemeClr val="tx1"/>
+          </a:fontRef>
+        </p:style>
+      </p:cxnSp>
+      <p:sp>
+        <p:nvSpPr>
+          <p:cNvPr id="6" name="Speech Bubble: Rectangle 5">
+            <a:extLst>
+              <a:ext uri="{FF2B5EF4-FFF2-40B4-BE49-F238E27FC236}">
+                <a16:creationId xmlns:a16="http://schemas.microsoft.com/office/drawing/2014/main" id="{48C3A2EE-542E-45FD-A49B-2A61D3D99E0C}"/>
               </a:ext>
             </a:extLst>
           </p:cNvPr>
@@ -4173,30 +3845,30 @@
         </p:nvSpPr>
         <p:spPr>
           <a:xfrm>
-            <a:off x="4978400" y="5689600"/>
-            <a:ext cx="4307840" cy="751840"/>
+            <a:off x="1339913" y="5341545"/>
+            <a:ext cx="4544839" cy="841972"/>
           </a:xfrm>
-          <a:prstGeom prst="borderCallout1">
+          <a:prstGeom prst="wedgeRectCallout">
             <a:avLst>
-              <a:gd name="adj1" fmla="val 53885"/>
-              <a:gd name="adj2" fmla="val -130"/>
-              <a:gd name="adj3" fmla="val -67230"/>
-              <a:gd name="adj4" fmla="val -31302"/>
+              <a:gd name="adj1" fmla="val -47327"/>
+              <a:gd name="adj2" fmla="val -194489"/>
             </a:avLst>
           </a:prstGeom>
         </p:spPr>
         <p:style>
           <a:lnRef idx="2">
-            <a:schemeClr val="accent1"/>
+            <a:schemeClr val="accent1">
+              <a:shade val="50000"/>
+            </a:schemeClr>
           </a:lnRef>
           <a:fillRef idx="1">
-            <a:schemeClr val="lt1"/>
+            <a:schemeClr val="accent1"/>
           </a:fillRef>
           <a:effectRef idx="0">
             <a:schemeClr val="accent1"/>
           </a:effectRef>
           <a:fontRef idx="minor">
-            <a:schemeClr val="dk1"/>
+            <a:schemeClr val="lt1"/>
           </a:fontRef>
         </p:style>
         <p:txBody>
@@ -4206,59 +3878,7 @@
             <a:pPr algn="ctr"/>
             <a:r>
               <a:rPr lang="en-US" dirty="0"/>
-              <a:t>Build up a data structure of partially processed elements (“deferred work”)</a:t>
-            </a:r>
-          </a:p>
-        </p:txBody>
-      </p:sp>
-      <p:sp>
-        <p:nvSpPr>
-          <p:cNvPr id="7" name="Callout: Line 6">
-            <a:extLst>
-              <a:ext uri="{FF2B5EF4-FFF2-40B4-BE49-F238E27FC236}">
-                <a16:creationId xmlns:a16="http://schemas.microsoft.com/office/drawing/2014/main" id="{EB6E191C-A65F-4443-97D4-9AF6EFFC850D}"/>
-              </a:ext>
-            </a:extLst>
-          </p:cNvPr>
-          <p:cNvSpPr/>
-          <p:nvPr/>
-        </p:nvSpPr>
-        <p:spPr>
-          <a:xfrm>
-            <a:off x="7162800" y="2578894"/>
-            <a:ext cx="4307840" cy="751840"/>
-          </a:xfrm>
-          <a:prstGeom prst="borderCallout1">
-            <a:avLst>
-              <a:gd name="adj1" fmla="val 53885"/>
-              <a:gd name="adj2" fmla="val -130"/>
-              <a:gd name="adj3" fmla="val 47635"/>
-              <a:gd name="adj4" fmla="val -49462"/>
-            </a:avLst>
-          </a:prstGeom>
-        </p:spPr>
-        <p:style>
-          <a:lnRef idx="2">
-            <a:schemeClr val="accent1"/>
-          </a:lnRef>
-          <a:fillRef idx="1">
-            <a:schemeClr val="lt1"/>
-          </a:fillRef>
-          <a:effectRef idx="0">
-            <a:schemeClr val="accent1"/>
-          </a:effectRef>
-          <a:fontRef idx="minor">
-            <a:schemeClr val="dk1"/>
-          </a:fontRef>
-        </p:style>
-        <p:txBody>
-          <a:bodyPr rtlCol="0" anchor="ctr"/>
-          <a:lstStyle/>
-          <a:p>
-            <a:pPr algn="ctr"/>
-            <a:r>
-              <a:rPr lang="en-US" dirty="0"/>
-              <a:t>We’ve seen all the data.  Now we can finishing processing all the elements.</a:t>
+              <a:t>Code must stop at this point?!?</a:t>
             </a:r>
           </a:p>
         </p:txBody>
@@ -4266,7 +3886,7 @@
     </p:spTree>
     <p:extLst>
       <p:ext uri="{BB962C8B-B14F-4D97-AF65-F5344CB8AC3E}">
-        <p14:creationId xmlns:p14="http://schemas.microsoft.com/office/powerpoint/2010/main" val="325008430"/>
+        <p14:creationId xmlns:p14="http://schemas.microsoft.com/office/powerpoint/2010/main" val="1392960394"/>
       </p:ext>
     </p:extLst>
   </p:cSld>
@@ -4298,7 +3918,7 @@
           <p:cNvPr id="2" name="Title 1">
             <a:extLst>
               <a:ext uri="{FF2B5EF4-FFF2-40B4-BE49-F238E27FC236}">
-                <a16:creationId xmlns:a16="http://schemas.microsoft.com/office/drawing/2014/main" id="{115BADC7-8BC2-43DE-B20E-1A30AE1CF795}"/>
+                <a16:creationId xmlns:a16="http://schemas.microsoft.com/office/drawing/2014/main" id="{B2CA12B1-ECB1-4529-A17E-B502476BECEF}"/>
               </a:ext>
             </a:extLst>
           </p:cNvPr>
@@ -4309,67 +3929,115 @@
             <p:ph type="title"/>
           </p:nvPr>
         </p:nvSpPr>
-        <p:spPr/>
+        <p:spPr>
+          <a:xfrm>
+            <a:off x="506993" y="365125"/>
+            <a:ext cx="11262511" cy="1325563"/>
+          </a:xfrm>
+        </p:spPr>
         <p:txBody>
           <a:bodyPr/>
           <a:lstStyle/>
           <a:p>
             <a:r>
               <a:rPr lang="en-US" dirty="0"/>
-              <a:t>The Basic Idea</a:t>
-            </a:r>
-          </a:p>
-        </p:txBody>
-      </p:sp>
-      <p:sp>
-        <p:nvSpPr>
-          <p:cNvPr id="3" name="Content Placeholder 2">
-            <a:extLst>
-              <a:ext uri="{FF2B5EF4-FFF2-40B4-BE49-F238E27FC236}">
-                <a16:creationId xmlns:a16="http://schemas.microsoft.com/office/drawing/2014/main" id="{7B2BD4E5-A1B4-4485-B584-7D5971C5CE3A}"/>
-              </a:ext>
-            </a:extLst>
-          </p:cNvPr>
-          <p:cNvSpPr>
-            <a:spLocks noGrp="1"/>
-          </p:cNvSpPr>
-          <p:nvPr>
-            <p:ph idx="1"/>
-          </p:nvPr>
-        </p:nvSpPr>
-        <p:spPr/>
-        <p:txBody>
-          <a:bodyPr/>
-          <a:lstStyle/>
+              <a:t>We make a TODO list for ourselves, then do it once we finish our current quicksort</a:t>
+            </a:r>
+          </a:p>
+        </p:txBody>
+      </p:sp>
+      <p:pic>
+        <p:nvPicPr>
+          <p:cNvPr id="3" name="Picture 2">
+            <a:extLst>
+              <a:ext uri="{FF2B5EF4-FFF2-40B4-BE49-F238E27FC236}">
+                <a16:creationId xmlns:a16="http://schemas.microsoft.com/office/drawing/2014/main" id="{7A8EE30C-D56B-4B48-B665-796B9CB2D177}"/>
+              </a:ext>
+            </a:extLst>
+          </p:cNvPr>
+          <p:cNvPicPr>
+            <a:picLocks noChangeAspect="1"/>
+          </p:cNvPicPr>
+          <p:nvPr/>
+        </p:nvPicPr>
+        <p:blipFill>
+          <a:blip r:embed="rId2"/>
+          <a:stretch>
+            <a:fillRect/>
+          </a:stretch>
+        </p:blipFill>
+        <p:spPr>
+          <a:xfrm>
+            <a:off x="203965" y="2271551"/>
+            <a:ext cx="11784070" cy="2314898"/>
+          </a:xfrm>
+          <a:prstGeom prst="rect">
+            <a:avLst/>
+          </a:prstGeom>
+        </p:spPr>
+      </p:pic>
+      <p:sp>
+        <p:nvSpPr>
+          <p:cNvPr id="7" name="Title 1">
+            <a:extLst>
+              <a:ext uri="{FF2B5EF4-FFF2-40B4-BE49-F238E27FC236}">
+                <a16:creationId xmlns:a16="http://schemas.microsoft.com/office/drawing/2014/main" id="{FD11397E-044D-4826-82C9-9095397388BD}"/>
+              </a:ext>
+            </a:extLst>
+          </p:cNvPr>
+          <p:cNvSpPr txBox="1">
+            <a:spLocks/>
+          </p:cNvSpPr>
+          <p:nvPr/>
+        </p:nvSpPr>
+        <p:spPr>
+          <a:xfrm>
+            <a:off x="203965" y="5089525"/>
+            <a:ext cx="11262511" cy="1325563"/>
+          </a:xfrm>
+          <a:prstGeom prst="rect">
+            <a:avLst/>
+          </a:prstGeom>
+        </p:spPr>
+        <p:txBody>
+          <a:bodyPr vert="horz" lIns="91440" tIns="45720" rIns="91440" bIns="45720" rtlCol="0" anchor="ctr">
+            <a:normAutofit/>
+          </a:bodyPr>
+          <a:lstStyle>
+            <a:lvl1pPr algn="l" defTabSz="914400" rtl="0" eaLnBrk="1" latinLnBrk="0" hangingPunct="1">
+              <a:lnSpc>
+                <a:spcPct val="90000"/>
+              </a:lnSpc>
+              <a:spcBef>
+                <a:spcPct val="0"/>
+              </a:spcBef>
+              <a:buNone/>
+              <a:defRPr sz="4400" kern="1200">
+                <a:solidFill>
+                  <a:schemeClr val="tx1"/>
+                </a:solidFill>
+                <a:latin typeface="+mj-lt"/>
+                <a:ea typeface="+mj-ea"/>
+                <a:cs typeface="+mj-cs"/>
+              </a:defRPr>
+            </a:lvl1pPr>
+          </a:lstStyle>
           <a:p>
             <a:r>
               <a:rPr lang="en-US" dirty="0"/>
-              <a:t>An algorithm is hard to convert to tail recursive form when the “deferred” work is complex </a:t>
-            </a:r>
-          </a:p>
-          <a:p>
-            <a:r>
-              <a:rPr lang="en-US" dirty="0"/>
-              <a:t>But if we construct a complex data structure, we can remind ourselves what we need to do next.  A “to do” list that reminds us what is next after we finish some particular bit of the calculation.  This structure is called </a:t>
+              <a:t>The TODO is a data structure called </a:t>
             </a:r>
             <a:r>
               <a:rPr lang="en-US" i="1" dirty="0"/>
               <a:t>the continuation</a:t>
             </a:r>
-            <a:r>
-              <a:rPr lang="en-US" dirty="0"/>
-              <a:t> (often abbreviated k)</a:t>
-            </a:r>
-          </a:p>
-          <a:p>
-            <a:endParaRPr lang="en-US" dirty="0"/>
           </a:p>
         </p:txBody>
       </p:sp>
     </p:spTree>
     <p:extLst>
       <p:ext uri="{BB962C8B-B14F-4D97-AF65-F5344CB8AC3E}">
-        <p14:creationId xmlns:p14="http://schemas.microsoft.com/office/powerpoint/2010/main" val="2804711085"/>
+        <p14:creationId xmlns:p14="http://schemas.microsoft.com/office/powerpoint/2010/main" val="1042171535"/>
       </p:ext>
     </p:extLst>
   </p:cSld>
@@ -4398,10 +4066,38 @@
       </p:grpSpPr>
       <p:sp>
         <p:nvSpPr>
+          <p:cNvPr id="2" name="Title 1">
+            <a:extLst>
+              <a:ext uri="{FF2B5EF4-FFF2-40B4-BE49-F238E27FC236}">
+                <a16:creationId xmlns:a16="http://schemas.microsoft.com/office/drawing/2014/main" id="{CCDB98A2-ADF6-49CF-B2F7-7A16D8E3FFEE}"/>
+              </a:ext>
+            </a:extLst>
+          </p:cNvPr>
+          <p:cNvSpPr>
+            <a:spLocks noGrp="1"/>
+          </p:cNvSpPr>
+          <p:nvPr>
+            <p:ph type="title"/>
+          </p:nvPr>
+        </p:nvSpPr>
+        <p:spPr/>
+        <p:txBody>
+          <a:bodyPr/>
+          <a:lstStyle/>
+          <a:p>
+            <a:r>
+              <a:rPr lang="en-US" dirty="0"/>
+              <a:t>Watch me do the conversion for quicksort</a:t>
+            </a:r>
+          </a:p>
+        </p:txBody>
+      </p:sp>
+      <p:sp>
+        <p:nvSpPr>
           <p:cNvPr id="3" name="Content Placeholder 2">
             <a:extLst>
               <a:ext uri="{FF2B5EF4-FFF2-40B4-BE49-F238E27FC236}">
-                <a16:creationId xmlns:a16="http://schemas.microsoft.com/office/drawing/2014/main" id="{E902EB0D-35F6-4B2C-B746-80E72390CBBF}"/>
+                <a16:creationId xmlns:a16="http://schemas.microsoft.com/office/drawing/2014/main" id="{5EE1D2B2-72F4-4759-B35B-B2BBF1233287}"/>
               </a:ext>
             </a:extLst>
           </p:cNvPr>
@@ -4412,230 +4108,14 @@
             <p:ph idx="1"/>
           </p:nvPr>
         </p:nvSpPr>
-        <p:spPr>
-          <a:xfrm>
-            <a:off x="137160" y="169545"/>
-            <a:ext cx="11917680" cy="4351338"/>
-          </a:xfrm>
-        </p:spPr>
-        <p:txBody>
-          <a:bodyPr>
-            <a:normAutofit/>
-          </a:bodyPr>
-          <a:lstStyle/>
-          <a:p>
-            <a:pPr marL="0" indent="0">
-              <a:buNone/>
-            </a:pPr>
-            <a:r>
-              <a:rPr lang="en-US" sz="2400" dirty="0">
-                <a:latin typeface="Consolas" panose="020B0609020204030204" pitchFamily="49" charset="0"/>
-              </a:rPr>
-              <a:t>(define powerset</a:t>
-            </a:r>
-          </a:p>
-          <a:p>
-            <a:pPr marL="0" indent="0">
-              <a:buNone/>
-            </a:pPr>
-            <a:r>
-              <a:rPr lang="en-US" sz="2400" dirty="0">
-                <a:latin typeface="Consolas" panose="020B0609020204030204" pitchFamily="49" charset="0"/>
-              </a:rPr>
-              <a:t>  (lambda (</a:t>
-            </a:r>
-            <a:r>
-              <a:rPr lang="en-US" sz="2400" dirty="0" err="1">
-                <a:latin typeface="Consolas" panose="020B0609020204030204" pitchFamily="49" charset="0"/>
-              </a:rPr>
-              <a:t>lst</a:t>
-            </a:r>
-            <a:r>
-              <a:rPr lang="en-US" sz="2400" dirty="0">
-                <a:latin typeface="Consolas" panose="020B0609020204030204" pitchFamily="49" charset="0"/>
-              </a:rPr>
-              <a:t>)</a:t>
-            </a:r>
-          </a:p>
-          <a:p>
-            <a:pPr marL="0" indent="0">
-              <a:buNone/>
-            </a:pPr>
-            <a:r>
-              <a:rPr lang="en-US" sz="2400" dirty="0">
-                <a:latin typeface="Consolas" panose="020B0609020204030204" pitchFamily="49" charset="0"/>
-              </a:rPr>
-              <a:t>    (if (null? </a:t>
-            </a:r>
-            <a:r>
-              <a:rPr lang="en-US" sz="2400" dirty="0" err="1">
-                <a:latin typeface="Consolas" panose="020B0609020204030204" pitchFamily="49" charset="0"/>
-              </a:rPr>
-              <a:t>lst</a:t>
-            </a:r>
-            <a:r>
-              <a:rPr lang="en-US" sz="2400" dirty="0">
-                <a:latin typeface="Consolas" panose="020B0609020204030204" pitchFamily="49" charset="0"/>
-              </a:rPr>
-              <a:t>)</a:t>
-            </a:r>
-          </a:p>
-          <a:p>
-            <a:pPr marL="0" indent="0">
-              <a:buNone/>
-            </a:pPr>
-            <a:r>
-              <a:rPr lang="en-US" sz="2400" dirty="0">
-                <a:latin typeface="Consolas" panose="020B0609020204030204" pitchFamily="49" charset="0"/>
-              </a:rPr>
-              <a:t>        '(())</a:t>
-            </a:r>
-          </a:p>
-          <a:p>
-            <a:pPr marL="0" indent="0">
-              <a:buNone/>
-            </a:pPr>
-            <a:r>
-              <a:rPr lang="en-US" sz="2400" dirty="0">
-                <a:latin typeface="Consolas" panose="020B0609020204030204" pitchFamily="49" charset="0"/>
-              </a:rPr>
-              <a:t>        (let* ((sub-powerset (powerset (</a:t>
-            </a:r>
-            <a:r>
-              <a:rPr lang="en-US" sz="2400" dirty="0" err="1">
-                <a:latin typeface="Consolas" panose="020B0609020204030204" pitchFamily="49" charset="0"/>
-              </a:rPr>
-              <a:t>cdr</a:t>
-            </a:r>
-            <a:r>
-              <a:rPr lang="en-US" sz="2400" dirty="0">
-                <a:latin typeface="Consolas" panose="020B0609020204030204" pitchFamily="49" charset="0"/>
-              </a:rPr>
-              <a:t> </a:t>
-            </a:r>
-            <a:r>
-              <a:rPr lang="en-US" sz="2400" dirty="0" err="1">
-                <a:latin typeface="Consolas" panose="020B0609020204030204" pitchFamily="49" charset="0"/>
-              </a:rPr>
-              <a:t>lst</a:t>
-            </a:r>
-            <a:r>
-              <a:rPr lang="en-US" sz="2400" dirty="0">
-                <a:latin typeface="Consolas" panose="020B0609020204030204" pitchFamily="49" charset="0"/>
-              </a:rPr>
-              <a:t>)))</a:t>
-            </a:r>
-          </a:p>
-          <a:p>
-            <a:pPr marL="0" indent="0">
-              <a:buNone/>
-            </a:pPr>
-            <a:r>
-              <a:rPr lang="en-US" sz="2400" dirty="0">
-                <a:latin typeface="Consolas" panose="020B0609020204030204" pitchFamily="49" charset="0"/>
-              </a:rPr>
-              <a:t>               (sub-powerset-with-car (prepend-to-all (car </a:t>
-            </a:r>
-            <a:r>
-              <a:rPr lang="en-US" sz="2400" dirty="0" err="1">
-                <a:latin typeface="Consolas" panose="020B0609020204030204" pitchFamily="49" charset="0"/>
-              </a:rPr>
-              <a:t>lst</a:t>
-            </a:r>
-            <a:r>
-              <a:rPr lang="en-US" sz="2400" dirty="0">
-                <a:latin typeface="Consolas" panose="020B0609020204030204" pitchFamily="49" charset="0"/>
-              </a:rPr>
-              <a:t>)</a:t>
-            </a:r>
-          </a:p>
-          <a:p>
-            <a:pPr marL="0" indent="0">
-              <a:buNone/>
-            </a:pPr>
-            <a:r>
-              <a:rPr lang="en-US" sz="2400" dirty="0">
-                <a:latin typeface="Consolas" panose="020B0609020204030204" pitchFamily="49" charset="0"/>
-              </a:rPr>
-              <a:t>                                                      sub-powerset)))</a:t>
-            </a:r>
-          </a:p>
-          <a:p>
-            <a:pPr marL="0" indent="0">
-              <a:buNone/>
-            </a:pPr>
-            <a:r>
-              <a:rPr lang="en-US" sz="2400" dirty="0">
-                <a:latin typeface="Consolas" panose="020B0609020204030204" pitchFamily="49" charset="0"/>
-              </a:rPr>
-              <a:t>          (append sub-powerset sub-powerset-with-car)))))</a:t>
-            </a:r>
-          </a:p>
-        </p:txBody>
-      </p:sp>
-      <p:sp>
-        <p:nvSpPr>
-          <p:cNvPr id="4" name="TextBox 3">
-            <a:extLst>
-              <a:ext uri="{FF2B5EF4-FFF2-40B4-BE49-F238E27FC236}">
-                <a16:creationId xmlns:a16="http://schemas.microsoft.com/office/drawing/2014/main" id="{2D39F944-DC3D-4B85-A2E8-32C870C94452}"/>
-              </a:ext>
-            </a:extLst>
-          </p:cNvPr>
-          <p:cNvSpPr txBox="1"/>
-          <p:nvPr/>
-        </p:nvSpPr>
-        <p:spPr>
-          <a:xfrm>
-            <a:off x="1381760" y="4846320"/>
-            <a:ext cx="7345680" cy="1631216"/>
-          </a:xfrm>
-          <a:prstGeom prst="rect">
-            <a:avLst/>
-          </a:prstGeom>
-          <a:noFill/>
-        </p:spPr>
-        <p:txBody>
-          <a:bodyPr wrap="square" rtlCol="0">
-            <a:spAutoFit/>
-          </a:bodyPr>
-          <a:lstStyle/>
-          <a:p>
-            <a:r>
-              <a:rPr lang="en-US" sz="2000" dirty="0"/>
-              <a:t>The algorithm:</a:t>
-            </a:r>
-          </a:p>
-          <a:p>
-            <a:r>
-              <a:rPr lang="en-US" sz="2000" dirty="0"/>
-              <a:t>Step 0.  Check if solution is trivial…if not…</a:t>
-            </a:r>
-          </a:p>
-          <a:p>
-            <a:r>
-              <a:rPr lang="en-US" sz="2000" dirty="0"/>
-              <a:t>Step 1.  Calculate the powerset of the </a:t>
-            </a:r>
-            <a:r>
-              <a:rPr lang="en-US" sz="2000" dirty="0" err="1"/>
-              <a:t>cdr</a:t>
-            </a:r>
-            <a:r>
-              <a:rPr lang="en-US" sz="2000" dirty="0"/>
-              <a:t> (sub-powerset)</a:t>
-            </a:r>
-          </a:p>
-          <a:p>
-            <a:r>
-              <a:rPr lang="en-US" sz="2000" dirty="0"/>
-              <a:t>Step 2.  Part the car to each entry (sub-powerset-with-car)</a:t>
-            </a:r>
-          </a:p>
-          <a:p>
-            <a:r>
-              <a:rPr lang="en-US" sz="2000" dirty="0"/>
-              <a:t>Step 3.  Append sub-powerset and sub-powerset-with-car together</a:t>
+        <p:spPr/>
+        <p:txBody>
+          <a:bodyPr/>
+          <a:lstStyle/>
+          <a:p>
+            <a:r>
+              <a:rPr lang="en-US" dirty="0"/>
+              <a:t>I’ll ask you to try and do Steps 1 and 2</a:t>
             </a:r>
           </a:p>
         </p:txBody>
@@ -4643,7 +4123,7 @@
     </p:spTree>
     <p:extLst>
       <p:ext uri="{BB962C8B-B14F-4D97-AF65-F5344CB8AC3E}">
-        <p14:creationId xmlns:p14="http://schemas.microsoft.com/office/powerpoint/2010/main" val="335906857"/>
+        <p14:creationId xmlns:p14="http://schemas.microsoft.com/office/powerpoint/2010/main" val="4091745088"/>
       </p:ext>
     </p:extLst>
   </p:cSld>
@@ -4675,89 +4155,6 @@
           <p:cNvPr id="2" name="Title 1">
             <a:extLst>
               <a:ext uri="{FF2B5EF4-FFF2-40B4-BE49-F238E27FC236}">
-                <a16:creationId xmlns:a16="http://schemas.microsoft.com/office/drawing/2014/main" id="{CCDB98A2-ADF6-49CF-B2F7-7A16D8E3FFEE}"/>
-              </a:ext>
-            </a:extLst>
-          </p:cNvPr>
-          <p:cNvSpPr>
-            <a:spLocks noGrp="1"/>
-          </p:cNvSpPr>
-          <p:nvPr>
-            <p:ph type="title"/>
-          </p:nvPr>
-        </p:nvSpPr>
-        <p:spPr/>
-        <p:txBody>
-          <a:bodyPr/>
-          <a:lstStyle/>
-          <a:p>
-            <a:r>
-              <a:rPr lang="en-US" dirty="0"/>
-              <a:t>Watch me do the conversion</a:t>
-            </a:r>
-          </a:p>
-        </p:txBody>
-      </p:sp>
-      <p:sp>
-        <p:nvSpPr>
-          <p:cNvPr id="3" name="Content Placeholder 2">
-            <a:extLst>
-              <a:ext uri="{FF2B5EF4-FFF2-40B4-BE49-F238E27FC236}">
-                <a16:creationId xmlns:a16="http://schemas.microsoft.com/office/drawing/2014/main" id="{5EE1D2B2-72F4-4759-B35B-B2BBF1233287}"/>
-              </a:ext>
-            </a:extLst>
-          </p:cNvPr>
-          <p:cNvSpPr>
-            <a:spLocks noGrp="1"/>
-          </p:cNvSpPr>
-          <p:nvPr>
-            <p:ph idx="1"/>
-          </p:nvPr>
-        </p:nvSpPr>
-        <p:spPr/>
-        <p:txBody>
-          <a:bodyPr/>
-          <a:lstStyle/>
-          <a:p>
-            <a:endParaRPr lang="en-US"/>
-          </a:p>
-        </p:txBody>
-      </p:sp>
-    </p:spTree>
-    <p:extLst>
-      <p:ext uri="{BB962C8B-B14F-4D97-AF65-F5344CB8AC3E}">
-        <p14:creationId xmlns:p14="http://schemas.microsoft.com/office/powerpoint/2010/main" val="4091745088"/>
-      </p:ext>
-    </p:extLst>
-  </p:cSld>
-  <p:clrMapOvr>
-    <a:masterClrMapping/>
-  </p:clrMapOvr>
-</p:sld>
-</file>
-
-<file path=ppt/slides/slide9.xml><?xml version="1.0" encoding="utf-8"?>
-<p:sld xmlns:a="http://schemas.openxmlformats.org/drawingml/2006/main" xmlns:r="http://schemas.openxmlformats.org/officeDocument/2006/relationships" xmlns:p="http://schemas.openxmlformats.org/presentationml/2006/main">
-  <p:cSld>
-    <p:spTree>
-      <p:nvGrpSpPr>
-        <p:cNvPr id="1" name=""/>
-        <p:cNvGrpSpPr/>
-        <p:nvPr/>
-      </p:nvGrpSpPr>
-      <p:grpSpPr>
-        <a:xfrm>
-          <a:off x="0" y="0"/>
-          <a:ext cx="0" cy="0"/>
-          <a:chOff x="0" y="0"/>
-          <a:chExt cx="0" cy="0"/>
-        </a:xfrm>
-      </p:grpSpPr>
-      <p:sp>
-        <p:nvSpPr>
-          <p:cNvPr id="2" name="Title 1">
-            <a:extLst>
-              <a:ext uri="{FF2B5EF4-FFF2-40B4-BE49-F238E27FC236}">
                 <a16:creationId xmlns:a16="http://schemas.microsoft.com/office/drawing/2014/main" id="{B8203FC4-AA5D-4804-8D1F-F24E33C33CB5}"/>
               </a:ext>
             </a:extLst>
@@ -4804,13 +4201,17 @@
           <a:p>
             <a:r>
               <a:rPr lang="en-US" dirty="0"/>
-              <a:t>I’ll ask you to do a conversion yourself </a:t>
-            </a:r>
-            <a:r>
-              <a:rPr lang="en-US"/>
-              <a:t>next class</a:t>
-            </a:r>
+              <a:t>I’ll ask you to do a conversion yourself next class</a:t>
+            </a:r>
+          </a:p>
+          <a:p>
             <a:endParaRPr lang="en-US" dirty="0"/>
+          </a:p>
+          <a:p>
+            <a:r>
+              <a:rPr lang="en-US" dirty="0"/>
+              <a:t>There is an additional video of me solving a different problem called powerset that you can watch plus the solution is in the repo</a:t>
+            </a:r>
           </a:p>
         </p:txBody>
       </p:sp>

</xml_diff>